<commit_message>
Folie Audit 4, Todos Iterationen add
</commit_message>
<xml_diff>
--- a/Audits/EPWS2223HausenKochZimmer Audit 3.pptx
+++ b/Audits/EPWS2223HausenKochZimmer Audit 3.pptx
@@ -239,7 +239,7 @@
           <a:p>
             <a:fld id="{14D7B175-9C0D-422E-AF9B-B2B60FEC5750}" type="datetimeFigureOut">
               <a:rPr lang="de-DE" smtClean="0"/>
-              <a:t>15.12.2022</a:t>
+              <a:t>10.01.2023</a:t>
             </a:fld>
             <a:endParaRPr lang="de-DE"/>
           </a:p>
@@ -417,7 +417,7 @@
           <a:p>
             <a:fld id="{331B08D1-1B10-48CA-BD23-DF971FF342A1}" type="datetimeFigureOut">
               <a:rPr lang="de-DE" smtClean="0"/>
-              <a:t>15.12.2022</a:t>
+              <a:t>10.01.2023</a:t>
             </a:fld>
             <a:endParaRPr lang="de-DE"/>
           </a:p>
@@ -1672,7 +1672,7 @@
           <a:p>
             <a:fld id="{ED1BC4C9-1A13-4EE7-AF10-A080FF9505FC}" type="datetime1">
               <a:rPr lang="de-DE" smtClean="0"/>
-              <a:t>15.12.2022</a:t>
+              <a:t>10.01.2023</a:t>
             </a:fld>
             <a:endParaRPr lang="de-DE"/>
           </a:p>
@@ -1870,7 +1870,7 @@
           <a:p>
             <a:fld id="{6C2AB422-32FC-42F3-9689-2B0D08DB4456}" type="datetime1">
               <a:rPr lang="de-DE" smtClean="0"/>
-              <a:t>15.12.2022</a:t>
+              <a:t>10.01.2023</a:t>
             </a:fld>
             <a:endParaRPr lang="de-DE"/>
           </a:p>
@@ -2078,7 +2078,7 @@
           <a:p>
             <a:fld id="{C1537AD8-4C02-4B23-A319-CD41525F0575}" type="datetime1">
               <a:rPr lang="de-DE" smtClean="0"/>
-              <a:t>15.12.2022</a:t>
+              <a:t>10.01.2023</a:t>
             </a:fld>
             <a:endParaRPr lang="de-DE"/>
           </a:p>
@@ -2276,7 +2276,7 @@
           <a:p>
             <a:fld id="{2542ACB1-0C11-4D97-B345-5791D5AFEBBD}" type="datetime1">
               <a:rPr lang="de-DE" smtClean="0"/>
-              <a:t>15.12.2022</a:t>
+              <a:t>10.01.2023</a:t>
             </a:fld>
             <a:endParaRPr lang="de-DE"/>
           </a:p>
@@ -2551,7 +2551,7 @@
           <a:p>
             <a:fld id="{CF8A9434-0CF4-4502-AC01-E50C47A78749}" type="datetime1">
               <a:rPr lang="de-DE" smtClean="0"/>
-              <a:t>15.12.2022</a:t>
+              <a:t>10.01.2023</a:t>
             </a:fld>
             <a:endParaRPr lang="de-DE"/>
           </a:p>
@@ -2816,7 +2816,7 @@
           <a:p>
             <a:fld id="{1C66BAD7-5AD9-4620-853F-EAED5CE5CCA9}" type="datetime1">
               <a:rPr lang="de-DE" smtClean="0"/>
-              <a:t>15.12.2022</a:t>
+              <a:t>10.01.2023</a:t>
             </a:fld>
             <a:endParaRPr lang="de-DE"/>
           </a:p>
@@ -3233,7 +3233,7 @@
           <a:p>
             <a:fld id="{F97251B6-C000-4B8B-8F25-F55B863C7B50}" type="datetime1">
               <a:rPr lang="de-DE" smtClean="0"/>
-              <a:t>15.12.2022</a:t>
+              <a:t>10.01.2023</a:t>
             </a:fld>
             <a:endParaRPr lang="de-DE"/>
           </a:p>
@@ -3379,7 +3379,7 @@
           <a:p>
             <a:fld id="{D7BA6ECB-C460-4FAF-AB91-F9078068F532}" type="datetime1">
               <a:rPr lang="de-DE" smtClean="0"/>
-              <a:t>15.12.2022</a:t>
+              <a:t>10.01.2023</a:t>
             </a:fld>
             <a:endParaRPr lang="de-DE"/>
           </a:p>
@@ -3492,7 +3492,7 @@
           <a:p>
             <a:fld id="{D1F6BFF4-EBC5-41EE-80C5-C44105A7A9B4}" type="datetime1">
               <a:rPr lang="de-DE" smtClean="0"/>
-              <a:t>15.12.2022</a:t>
+              <a:t>10.01.2023</a:t>
             </a:fld>
             <a:endParaRPr lang="de-DE"/>
           </a:p>
@@ -3803,7 +3803,7 @@
           <a:p>
             <a:fld id="{FEDC9D51-5166-4312-BA3B-571CE0B8ECE6}" type="datetime1">
               <a:rPr lang="de-DE" smtClean="0"/>
-              <a:t>15.12.2022</a:t>
+              <a:t>10.01.2023</a:t>
             </a:fld>
             <a:endParaRPr lang="de-DE"/>
           </a:p>
@@ -4096,7 +4096,7 @@
           <a:p>
             <a:fld id="{0D75F604-7643-422C-9716-5D15F8DAA7CB}" type="datetime1">
               <a:rPr lang="de-DE" smtClean="0"/>
-              <a:t>15.12.2022</a:t>
+              <a:t>10.01.2023</a:t>
             </a:fld>
             <a:endParaRPr lang="de-DE"/>
           </a:p>
@@ -4379,7 +4379,7 @@
           <a:p>
             <a:fld id="{EAE11A2B-C0F6-4A44-84BB-6682D02704B4}" type="datetime1">
               <a:rPr lang="de-DE" smtClean="0"/>
-              <a:t>15.12.2022</a:t>
+              <a:t>10.01.2023</a:t>
             </a:fld>
             <a:endParaRPr lang="de-DE"/>
           </a:p>
@@ -5705,19 +5705,25 @@
           <a:bodyPr/>
           <a:lstStyle/>
           <a:p>
+            <a:pPr algn="ctr"/>
             <a:r>
               <a:rPr lang="de-DE" dirty="0"/>
               <a:t> </a:t>
             </a:r>
-          </a:p>
-        </p:txBody>
-      </p:sp>
-      <p:sp>
-        <p:nvSpPr>
-          <p:cNvPr id="3" name="Inhaltsplatzhalter 2">
-            <a:extLst>
-              <a:ext uri="{FF2B5EF4-FFF2-40B4-BE49-F238E27FC236}">
-                <a16:creationId xmlns:a16="http://schemas.microsoft.com/office/drawing/2014/main" id="{26828B3D-0288-9D01-3FAB-ED2A638AE90B}"/>
+            <a:r>
+              <a:rPr lang="de-DE" dirty="0" err="1"/>
+              <a:t>ToDos</a:t>
+            </a:r>
+            <a:endParaRPr lang="de-DE" dirty="0"/>
+          </a:p>
+        </p:txBody>
+      </p:sp>
+      <p:sp>
+        <p:nvSpPr>
+          <p:cNvPr id="6" name="Inhaltsplatzhalter 5">
+            <a:extLst>
+              <a:ext uri="{FF2B5EF4-FFF2-40B4-BE49-F238E27FC236}">
+                <a16:creationId xmlns:a16="http://schemas.microsoft.com/office/drawing/2014/main" id="{DF0E3F5A-7EE9-24A6-C4BF-E37D9B670A03}"/>
               </a:ext>
             </a:extLst>
           </p:cNvPr>
@@ -5732,6 +5738,52 @@
         <p:txBody>
           <a:bodyPr/>
           <a:lstStyle/>
+          <a:p>
+            <a:r>
+              <a:rPr lang="de-DE" b="0" i="0" dirty="0">
+                <a:effectLst/>
+                <a:latin typeface="gg sans"/>
+              </a:rPr>
+              <a:t>Anforderungen</a:t>
+            </a:r>
+          </a:p>
+          <a:p>
+            <a:r>
+              <a:rPr lang="de-DE" dirty="0"/>
+              <a:t>Risikoanalyse</a:t>
+            </a:r>
+          </a:p>
+          <a:p>
+            <a:r>
+              <a:rPr lang="de-DE" dirty="0"/>
+              <a:t>Userprofiles</a:t>
+            </a:r>
+          </a:p>
+          <a:p>
+            <a:r>
+              <a:rPr lang="de-DE" dirty="0" err="1"/>
+              <a:t>Usecases</a:t>
+            </a:r>
+            <a:endParaRPr lang="de-DE" dirty="0"/>
+          </a:p>
+          <a:p>
+            <a:r>
+              <a:rPr lang="de-DE" dirty="0"/>
+              <a:t>PoCs</a:t>
+            </a:r>
+          </a:p>
+          <a:p>
+            <a:r>
+              <a:rPr lang="de-DE" dirty="0"/>
+              <a:t>Zeitplan (bis Audit 4)</a:t>
+            </a:r>
+          </a:p>
+          <a:p>
+            <a:r>
+              <a:rPr lang="de-DE" dirty="0"/>
+              <a:t>Projektplan Meeting Art</a:t>
+            </a:r>
+          </a:p>
           <a:p>
             <a:endParaRPr lang="de-DE" dirty="0"/>
           </a:p>

</xml_diff>

<commit_message>
Vorbereitung für die Präsentationsfolien
</commit_message>
<xml_diff>
--- a/Audits/EPWS2223HausenKochZimmer Audit 3.pptx
+++ b/Audits/EPWS2223HausenKochZimmer Audit 3.pptx
@@ -14,8 +14,8 @@
     <p:sldId id="256" r:id="rId2"/>
     <p:sldId id="257" r:id="rId3"/>
     <p:sldId id="258" r:id="rId4"/>
-    <p:sldId id="259" r:id="rId5"/>
-    <p:sldId id="260" r:id="rId6"/>
+    <p:sldId id="260" r:id="rId5"/>
+    <p:sldId id="259" r:id="rId6"/>
     <p:sldId id="261" r:id="rId7"/>
     <p:sldId id="262" r:id="rId8"/>
     <p:sldId id="263" r:id="rId9"/>
@@ -127,8 +127,8 @@
             <p14:sldId id="256"/>
             <p14:sldId id="257"/>
             <p14:sldId id="258"/>
+            <p14:sldId id="260"/>
             <p14:sldId id="259"/>
-            <p14:sldId id="260"/>
             <p14:sldId id="261"/>
             <p14:sldId id="262"/>
             <p14:sldId id="263"/>
@@ -1095,7 +1095,7 @@
     </p:spTree>
     <p:extLst>
       <p:ext uri="{BB962C8B-B14F-4D97-AF65-F5344CB8AC3E}">
-        <p14:creationId xmlns:p14="http://schemas.microsoft.com/office/powerpoint/2010/main" val="1653405182"/>
+        <p14:creationId xmlns:p14="http://schemas.microsoft.com/office/powerpoint/2010/main" val="3745376474"/>
       </p:ext>
     </p:extLst>
   </p:cSld>
@@ -1179,7 +1179,7 @@
     </p:spTree>
     <p:extLst>
       <p:ext uri="{BB962C8B-B14F-4D97-AF65-F5344CB8AC3E}">
-        <p14:creationId xmlns:p14="http://schemas.microsoft.com/office/powerpoint/2010/main" val="3745376474"/>
+        <p14:creationId xmlns:p14="http://schemas.microsoft.com/office/powerpoint/2010/main" val="1653405182"/>
       </p:ext>
     </p:extLst>
   </p:cSld>
@@ -5566,7 +5566,7 @@
             <a:pPr algn="ctr"/>
             <a:r>
               <a:rPr lang="de-DE" dirty="0"/>
-              <a:t>Projektplan</a:t>
+              <a:t>Projektplan/Zeitplan</a:t>
             </a:r>
           </a:p>
         </p:txBody>
@@ -5600,20 +5600,6 @@
             <a:endParaRPr lang="de-DE" sz="3200" dirty="0">
               <a:hlinkClick r:id="rId3"/>
             </a:endParaRPr>
-          </a:p>
-          <a:p>
-            <a:pPr lvl="0"/>
-            <a:r>
-              <a:rPr lang="de-DE" sz="3200" dirty="0"/>
-              <a:t>Artefakte als Darstellung, Link als Extra</a:t>
-            </a:r>
-          </a:p>
-          <a:p>
-            <a:pPr lvl="0"/>
-            <a:r>
-              <a:rPr lang="de-DE" sz="3200" dirty="0"/>
-              <a:t>Notiz beschreibend, bzw. erklärend</a:t>
-            </a:r>
           </a:p>
         </p:txBody>
       </p:sp>
@@ -5706,14 +5692,6 @@
           <a:lstStyle/>
           <a:p>
             <a:pPr algn="ctr"/>
-            <a:r>
-              <a:rPr lang="de-DE" dirty="0"/>
-              <a:t> </a:t>
-            </a:r>
-            <a:r>
-              <a:rPr lang="de-DE" dirty="0" err="1"/>
-              <a:t>ToDos</a:t>
-            </a:r>
             <a:endParaRPr lang="de-DE" dirty="0"/>
           </a:p>
         </p:txBody>
@@ -5738,52 +5716,6 @@
         <p:txBody>
           <a:bodyPr/>
           <a:lstStyle/>
-          <a:p>
-            <a:r>
-              <a:rPr lang="de-DE" b="0" i="0" dirty="0">
-                <a:effectLst/>
-                <a:latin typeface="gg sans"/>
-              </a:rPr>
-              <a:t>Anforderungen</a:t>
-            </a:r>
-          </a:p>
-          <a:p>
-            <a:r>
-              <a:rPr lang="de-DE" dirty="0"/>
-              <a:t>Risikoanalyse</a:t>
-            </a:r>
-          </a:p>
-          <a:p>
-            <a:r>
-              <a:rPr lang="de-DE" dirty="0"/>
-              <a:t>Userprofiles</a:t>
-            </a:r>
-          </a:p>
-          <a:p>
-            <a:r>
-              <a:rPr lang="de-DE" dirty="0" err="1"/>
-              <a:t>Usecases</a:t>
-            </a:r>
-            <a:endParaRPr lang="de-DE" dirty="0"/>
-          </a:p>
-          <a:p>
-            <a:r>
-              <a:rPr lang="de-DE" dirty="0"/>
-              <a:t>PoCs</a:t>
-            </a:r>
-          </a:p>
-          <a:p>
-            <a:r>
-              <a:rPr lang="de-DE" dirty="0"/>
-              <a:t>Zeitplan (bis Audit 4)</a:t>
-            </a:r>
-          </a:p>
-          <a:p>
-            <a:r>
-              <a:rPr lang="de-DE" dirty="0"/>
-              <a:t>Projektplan Meeting Art</a:t>
-            </a:r>
-          </a:p>
           <a:p>
             <a:endParaRPr lang="de-DE" dirty="0"/>
           </a:p>
@@ -5883,6 +5815,31 @@
       </p:sp>
       <p:sp>
         <p:nvSpPr>
+          <p:cNvPr id="3" name="Inhaltsplatzhalter 2">
+            <a:extLst>
+              <a:ext uri="{FF2B5EF4-FFF2-40B4-BE49-F238E27FC236}">
+                <a16:creationId xmlns:a16="http://schemas.microsoft.com/office/drawing/2014/main" id="{26828B3D-0288-9D01-3FAB-ED2A638AE90B}"/>
+              </a:ext>
+            </a:extLst>
+          </p:cNvPr>
+          <p:cNvSpPr>
+            <a:spLocks noGrp="1"/>
+          </p:cNvSpPr>
+          <p:nvPr>
+            <p:ph idx="1"/>
+          </p:nvPr>
+        </p:nvSpPr>
+        <p:spPr/>
+        <p:txBody>
+          <a:bodyPr/>
+          <a:lstStyle/>
+          <a:p>
+            <a:endParaRPr lang="de-DE" dirty="0"/>
+          </a:p>
+        </p:txBody>
+      </p:sp>
+      <p:sp>
+        <p:nvSpPr>
           <p:cNvPr id="5" name="Foliennummernplatzhalter 4">
             <a:extLst>
               <a:ext uri="{FF2B5EF4-FFF2-40B4-BE49-F238E27FC236}">
@@ -5921,7 +5878,7 @@
     </p:spTree>
     <p:extLst>
       <p:ext uri="{BB962C8B-B14F-4D97-AF65-F5344CB8AC3E}">
-        <p14:creationId xmlns:p14="http://schemas.microsoft.com/office/powerpoint/2010/main" val="1602302725"/>
+        <p14:creationId xmlns:p14="http://schemas.microsoft.com/office/powerpoint/2010/main" val="738318702"/>
       </p:ext>
     </p:extLst>
   </p:cSld>
@@ -5950,10 +5907,10 @@
       </p:grpSpPr>
       <p:sp>
         <p:nvSpPr>
-          <p:cNvPr id="2" name="Titel 1">
-            <a:extLst>
-              <a:ext uri="{FF2B5EF4-FFF2-40B4-BE49-F238E27FC236}">
-                <a16:creationId xmlns:a16="http://schemas.microsoft.com/office/drawing/2014/main" id="{4AC7DED0-9976-693C-8B24-D84F23C8E7B6}"/>
+          <p:cNvPr id="3" name="Titel 2">
+            <a:extLst>
+              <a:ext uri="{FF2B5EF4-FFF2-40B4-BE49-F238E27FC236}">
+                <a16:creationId xmlns:a16="http://schemas.microsoft.com/office/drawing/2014/main" id="{53AD19EA-19FD-31C3-9A36-EC2C3ECA7425}"/>
               </a:ext>
             </a:extLst>
           </p:cNvPr>
@@ -5975,10 +5932,10 @@
       </p:sp>
       <p:sp>
         <p:nvSpPr>
-          <p:cNvPr id="3" name="Inhaltsplatzhalter 2">
-            <a:extLst>
-              <a:ext uri="{FF2B5EF4-FFF2-40B4-BE49-F238E27FC236}">
-                <a16:creationId xmlns:a16="http://schemas.microsoft.com/office/drawing/2014/main" id="{26828B3D-0288-9D01-3FAB-ED2A638AE90B}"/>
+          <p:cNvPr id="4" name="Inhaltsplatzhalter 3">
+            <a:extLst>
+              <a:ext uri="{FF2B5EF4-FFF2-40B4-BE49-F238E27FC236}">
+                <a16:creationId xmlns:a16="http://schemas.microsoft.com/office/drawing/2014/main" id="{43D36CD5-C13A-93D9-C18B-BCA6C25AEC2A}"/>
               </a:ext>
             </a:extLst>
           </p:cNvPr>
@@ -6038,7 +5995,7 @@
     </p:spTree>
     <p:extLst>
       <p:ext uri="{BB962C8B-B14F-4D97-AF65-F5344CB8AC3E}">
-        <p14:creationId xmlns:p14="http://schemas.microsoft.com/office/powerpoint/2010/main" val="738318702"/>
+        <p14:creationId xmlns:p14="http://schemas.microsoft.com/office/powerpoint/2010/main" val="1602302725"/>
       </p:ext>
     </p:extLst>
   </p:cSld>

</xml_diff>

<commit_message>
poc bild eingefügt in präse
poc bild eigefügt
</commit_message>
<xml_diff>
--- a/Audits/EPWS2223HausenKochZimmer Audit 3.pptx
+++ b/Audits/EPWS2223HausenKochZimmer Audit 3.pptx
@@ -13,10 +13,10 @@
   <p:sldIdLst>
     <p:sldId id="256" r:id="rId2"/>
     <p:sldId id="257" r:id="rId3"/>
-    <p:sldId id="258" r:id="rId4"/>
-    <p:sldId id="260" r:id="rId5"/>
-    <p:sldId id="259" r:id="rId6"/>
-    <p:sldId id="261" r:id="rId7"/>
+    <p:sldId id="261" r:id="rId4"/>
+    <p:sldId id="258" r:id="rId5"/>
+    <p:sldId id="260" r:id="rId6"/>
+    <p:sldId id="259" r:id="rId7"/>
     <p:sldId id="262" r:id="rId8"/>
     <p:sldId id="263" r:id="rId9"/>
     <p:sldId id="264" r:id="rId10"/>
@@ -126,10 +126,10 @@
           <p14:sldIdLst>
             <p14:sldId id="256"/>
             <p14:sldId id="257"/>
+            <p14:sldId id="261"/>
             <p14:sldId id="258"/>
             <p14:sldId id="260"/>
             <p14:sldId id="259"/>
-            <p14:sldId id="261"/>
             <p14:sldId id="262"/>
             <p14:sldId id="263"/>
             <p14:sldId id="264"/>
@@ -239,7 +239,7 @@
           <a:p>
             <a:fld id="{14D7B175-9C0D-422E-AF9B-B2B60FEC5750}" type="datetimeFigureOut">
               <a:rPr lang="de-DE" smtClean="0"/>
-              <a:t>11.01.2023</a:t>
+              <a:t>12.01.2023</a:t>
             </a:fld>
             <a:endParaRPr lang="de-DE"/>
           </a:p>
@@ -417,7 +417,7 @@
           <a:p>
             <a:fld id="{331B08D1-1B10-48CA-BD23-DF971FF342A1}" type="datetimeFigureOut">
               <a:rPr lang="de-DE" smtClean="0"/>
-              <a:t>11.01.2023</a:t>
+              <a:t>12.01.2023</a:t>
             </a:fld>
             <a:endParaRPr lang="de-DE"/>
           </a:p>
@@ -981,127 +981,160 @@
           <a:bodyPr/>
           <a:lstStyle/>
           <a:p>
-            <a:pPr marL="0" marR="0" lvl="0" indent="0" algn="l" defTabSz="914400" rtl="0" eaLnBrk="1" fontAlgn="auto" latinLnBrk="0" hangingPunct="1">
-              <a:lnSpc>
-                <a:spcPct val="100000"/>
-              </a:lnSpc>
-              <a:spcBef>
-                <a:spcPts val="0"/>
-              </a:spcBef>
-              <a:spcAft>
-                <a:spcPts val="0"/>
-              </a:spcAft>
-              <a:buClrTx/>
-              <a:buSzTx/>
-              <a:buFontTx/>
-              <a:buNone/>
-              <a:tabLst/>
-              <a:defRPr/>
-            </a:pPr>
-            <a:r>
-              <a:rPr lang="de-DE" b="0" i="0" dirty="0">
-                <a:solidFill>
-                  <a:srgbClr val="374151"/>
-                </a:solidFill>
-                <a:effectLst/>
-                <a:latin typeface="Söhne"/>
-              </a:rPr>
-              <a:t>Dieser Code implementiert eine Pub/Sub-Funktionalität für eine Android-App. Es gibt zwei Schaltflächen in der Benutzeroberfläche, eine zum Abonnieren (</a:t>
-            </a:r>
-            <a:r>
-              <a:rPr lang="de-DE" b="0" i="0" dirty="0" err="1">
-                <a:solidFill>
-                  <a:srgbClr val="374151"/>
-                </a:solidFill>
-                <a:effectLst/>
-                <a:latin typeface="Söhne"/>
-              </a:rPr>
-              <a:t>subscribe</a:t>
-            </a:r>
-            <a:r>
-              <a:rPr lang="de-DE" b="0" i="0" dirty="0">
-                <a:solidFill>
-                  <a:srgbClr val="374151"/>
-                </a:solidFill>
-                <a:effectLst/>
-                <a:latin typeface="Söhne"/>
-              </a:rPr>
-              <a:t>) und eine zum Veröffentlichen (publish). Beim Klicken auf die Schaltfläche „</a:t>
-            </a:r>
-            <a:r>
-              <a:rPr lang="de-DE" b="0" i="0" dirty="0" err="1">
-                <a:solidFill>
-                  <a:srgbClr val="374151"/>
-                </a:solidFill>
-                <a:effectLst/>
-                <a:latin typeface="Söhne"/>
-              </a:rPr>
-              <a:t>Subscribe</a:t>
-            </a:r>
-            <a:r>
-              <a:rPr lang="de-DE" b="0" i="0" dirty="0">
-                <a:solidFill>
-                  <a:srgbClr val="374151"/>
-                </a:solidFill>
-                <a:effectLst/>
-                <a:latin typeface="Söhne"/>
-              </a:rPr>
-              <a:t>" wird geprüft, ob der Benutzername bereits in der Liste der Abonnenten enthalten ist. Wenn nicht, wird der Benutzername zur Liste hinzugefügt. Wenn der Benutzername bereits in der Liste vorhanden ist, wird er aus der Liste entfernt und eine Meldung „</a:t>
-            </a:r>
-            <a:r>
-              <a:rPr lang="de-DE" b="0" i="0" dirty="0" err="1">
-                <a:solidFill>
-                  <a:srgbClr val="374151"/>
-                </a:solidFill>
-                <a:effectLst/>
-                <a:latin typeface="Söhne"/>
-              </a:rPr>
-              <a:t>Unsubscribed</a:t>
-            </a:r>
-            <a:r>
-              <a:rPr lang="de-DE" b="0" i="0" dirty="0">
-                <a:solidFill>
-                  <a:srgbClr val="374151"/>
-                </a:solidFill>
-                <a:effectLst/>
-                <a:latin typeface="Söhne"/>
-              </a:rPr>
-              <a:t>" angezeigt. Beim Klicken auf die Schaltfläche "Veröffentlichen" soll ein Abonnent die Möglichkeit haben, ein Bild zu einer  Stadt hochzuladen und anschließend werden alle Abonnenten in der Liste benachrichtigt. Wenn ein User nicht </a:t>
-            </a:r>
-            <a:r>
-              <a:rPr lang="de-DE" b="0" i="0" dirty="0" err="1">
-                <a:solidFill>
-                  <a:srgbClr val="374151"/>
-                </a:solidFill>
-                <a:effectLst/>
-                <a:latin typeface="Söhne"/>
-              </a:rPr>
-              <a:t>subscribed</a:t>
-            </a:r>
-            <a:r>
-              <a:rPr lang="de-DE" b="0" i="0" dirty="0">
-                <a:solidFill>
-                  <a:srgbClr val="374151"/>
-                </a:solidFill>
-                <a:effectLst/>
-                <a:latin typeface="Söhne"/>
-              </a:rPr>
-              <a:t> ist, hat er nicht die Möglichkeit, ein Bild zu einer </a:t>
-            </a:r>
-            <a:r>
-              <a:rPr lang="de-DE" b="0" i="0">
-                <a:solidFill>
-                  <a:srgbClr val="374151"/>
-                </a:solidFill>
-                <a:effectLst/>
-                <a:latin typeface="Söhne"/>
-              </a:rPr>
-              <a:t>Stadt hochzuladen.</a:t>
-            </a:r>
-            <a:endParaRPr lang="de-DE" dirty="0"/>
-          </a:p>
-          <a:p>
-            <a:endParaRPr lang="de-DE" dirty="0"/>
+            <a:r>
+              <a:rPr lang="de-DE" dirty="0"/>
+              <a:t>Upload eines Bildes</a:t>
+            </a:r>
+          </a:p>
+          <a:p>
+            <a:r>
+              <a:rPr lang="de-DE" dirty="0"/>
+              <a:t>Ablauf: Beim diesem POC ist geplant, dass er neben der Verarbeitung der gängigen </a:t>
+            </a:r>
+            <a:r>
+              <a:rPr lang="de-DE" dirty="0" err="1"/>
+              <a:t>Bildatei</a:t>
+            </a:r>
+            <a:r>
+              <a:rPr lang="de-DE" dirty="0"/>
+              <a:t> ebenso einige der für das System relevanten Metadaten der digitalisierten </a:t>
+            </a:r>
+            <a:r>
+              <a:rPr lang="de-DE" dirty="0" err="1"/>
+              <a:t>Bildatei</a:t>
+            </a:r>
+            <a:r>
+              <a:rPr lang="de-DE" dirty="0"/>
+              <a:t> verarbeitet. Als gängige </a:t>
+            </a:r>
+            <a:r>
+              <a:rPr lang="de-DE" dirty="0" err="1"/>
+              <a:t>Bildateien</a:t>
+            </a:r>
+            <a:r>
+              <a:rPr lang="de-DE" dirty="0"/>
+              <a:t> sind uns </a:t>
+            </a:r>
+            <a:r>
+              <a:rPr lang="de-DE" dirty="0" err="1"/>
+              <a:t>png</a:t>
+            </a:r>
+            <a:r>
+              <a:rPr lang="de-DE" dirty="0"/>
+              <a:t>, </a:t>
+            </a:r>
+            <a:r>
+              <a:rPr lang="de-DE" dirty="0" err="1"/>
+              <a:t>jpeg</a:t>
+            </a:r>
+            <a:r>
+              <a:rPr lang="de-DE" dirty="0"/>
+              <a:t> sowie </a:t>
+            </a:r>
+            <a:r>
+              <a:rPr lang="de-DE" dirty="0" err="1"/>
+              <a:t>webp</a:t>
+            </a:r>
+            <a:r>
+              <a:rPr lang="de-DE" dirty="0"/>
+              <a:t> geläufig und bei Recherchen zu Bildverarbeitung durch </a:t>
+            </a:r>
+            <a:r>
+              <a:rPr lang="de-DE" dirty="0" err="1"/>
+              <a:t>Kotlin</a:t>
+            </a:r>
+            <a:r>
+              <a:rPr lang="de-DE" dirty="0"/>
+              <a:t>, haben wir diese Formate als </a:t>
+            </a:r>
+            <a:r>
+              <a:rPr lang="de-DE" dirty="0" err="1"/>
+              <a:t>standart</a:t>
+            </a:r>
+            <a:r>
+              <a:rPr lang="de-DE" dirty="0"/>
+              <a:t> verarbeitbare Formate Identifiziert. Als relevante Metadaten haben wir die Auflösung, Bildformat, Uploader identifiziert, diese dienen vor allem zur Qualitätskontrolle, zum Verarbeiten und zum Zuordnen.</a:t>
+            </a:r>
+          </a:p>
+          <a:p>
+            <a:r>
+              <a:rPr lang="de-DE" dirty="0"/>
+              <a:t>Exit-Kriterien, Fail- Kriterien: Ergeben sich aus dem Ablauf des POCs</a:t>
+            </a:r>
+          </a:p>
+          <a:p>
+            <a:r>
+              <a:rPr lang="de-DE" dirty="0" err="1"/>
+              <a:t>Fallback</a:t>
+            </a:r>
+            <a:r>
+              <a:rPr lang="de-DE" dirty="0"/>
+              <a:t>: Der </a:t>
+            </a:r>
+            <a:r>
+              <a:rPr lang="de-DE" dirty="0" err="1"/>
+              <a:t>Fallback</a:t>
+            </a:r>
+            <a:r>
+              <a:rPr lang="de-DE" dirty="0"/>
+              <a:t> des </a:t>
+            </a:r>
+            <a:r>
+              <a:rPr lang="de-DE" dirty="0" err="1"/>
+              <a:t>Bilderuplads</a:t>
+            </a:r>
+            <a:r>
+              <a:rPr lang="de-DE" dirty="0"/>
+              <a:t> per Fehlermeldung soll es ermöglichen das der User immer sein Upload aus seiner Sicht erledigen kann oder wenn nötig weiß das er dies z.B. später ohne Probleme erledigen kann. Das System kann bei Störungen nicht auf alternative Funktionalitäten zurückgreifen, da der Upload als Kernfunktionalität nicht angemessen genug ersetzt werden könnte.</a:t>
+            </a:r>
+          </a:p>
+          <a:p>
+            <a:r>
+              <a:rPr lang="de-DE" dirty="0"/>
+              <a:t>Ein Fehler beim verarbeiten der Metadaten der Bilder darf den wesentlich wichtigeren Ablauf des POC nicht stören, da diese wenn nötig auch zu einem späteren Zeitpunkt ergänzt werden können.</a:t>
+            </a:r>
+          </a:p>
+          <a:p>
+            <a:r>
+              <a:rPr lang="de-DE" dirty="0"/>
+              <a:t>Die Begrenzung der </a:t>
+            </a:r>
+            <a:r>
+              <a:rPr lang="de-DE" dirty="0" err="1"/>
+              <a:t>Uploadbaren</a:t>
+            </a:r>
+            <a:r>
+              <a:rPr lang="de-DE" dirty="0"/>
+              <a:t> </a:t>
+            </a:r>
+            <a:r>
+              <a:rPr lang="de-DE" dirty="0" err="1"/>
+              <a:t>Bilformate</a:t>
+            </a:r>
+            <a:r>
+              <a:rPr lang="de-DE" dirty="0"/>
+              <a:t> auf z.B. nur </a:t>
+            </a:r>
+            <a:r>
+              <a:rPr lang="de-DE" dirty="0" err="1"/>
+              <a:t>jpq</a:t>
+            </a:r>
+            <a:r>
+              <a:rPr lang="de-DE" dirty="0"/>
+              <a:t> ist eine Option um die Funktionalität zusichern, würde aber auch die User Experimente negativ einfließen.</a:t>
+            </a:r>
+          </a:p>
+          <a:p>
+            <a:r>
+              <a:rPr lang="de-DE" dirty="0"/>
+              <a:t>Aufruf eines gespeicherten Bildes</a:t>
+            </a:r>
+          </a:p>
+          <a:p>
+            <a:r>
+              <a:rPr lang="de-DE" dirty="0"/>
+              <a:t>Bei diesem POC soll sichergestellt werden das die User des User-Contents eine entsprechende Anzeige erhalten, um eine Irritation zu verhindern. </a:t>
+            </a:r>
           </a:p>
         </p:txBody>
       </p:sp>
@@ -1131,7 +1164,7 @@
     </p:spTree>
     <p:extLst>
       <p:ext uri="{BB962C8B-B14F-4D97-AF65-F5344CB8AC3E}">
-        <p14:creationId xmlns:p14="http://schemas.microsoft.com/office/powerpoint/2010/main" val="2321389857"/>
+        <p14:creationId xmlns:p14="http://schemas.microsoft.com/office/powerpoint/2010/main" val="2618932596"/>
       </p:ext>
     </p:extLst>
   </p:cSld>
@@ -1185,6 +1218,126 @@
           <a:bodyPr/>
           <a:lstStyle/>
           <a:p>
+            <a:pPr marL="0" marR="0" lvl="0" indent="0" algn="l" defTabSz="914400" rtl="0" eaLnBrk="1" fontAlgn="auto" latinLnBrk="0" hangingPunct="1">
+              <a:lnSpc>
+                <a:spcPct val="100000"/>
+              </a:lnSpc>
+              <a:spcBef>
+                <a:spcPts val="0"/>
+              </a:spcBef>
+              <a:spcAft>
+                <a:spcPts val="0"/>
+              </a:spcAft>
+              <a:buClrTx/>
+              <a:buSzTx/>
+              <a:buFontTx/>
+              <a:buNone/>
+              <a:tabLst/>
+              <a:defRPr/>
+            </a:pPr>
+            <a:r>
+              <a:rPr lang="de-DE" b="0" i="0" dirty="0">
+                <a:solidFill>
+                  <a:srgbClr val="374151"/>
+                </a:solidFill>
+                <a:effectLst/>
+                <a:latin typeface="Söhne"/>
+              </a:rPr>
+              <a:t>Dieser Code implementiert eine Pub/Sub-Funktionalität für eine Android-App. Es gibt zwei Schaltflächen in der Benutzeroberfläche, eine zum Abonnieren (</a:t>
+            </a:r>
+            <a:r>
+              <a:rPr lang="de-DE" b="0" i="0" dirty="0" err="1">
+                <a:solidFill>
+                  <a:srgbClr val="374151"/>
+                </a:solidFill>
+                <a:effectLst/>
+                <a:latin typeface="Söhne"/>
+              </a:rPr>
+              <a:t>subscribe</a:t>
+            </a:r>
+            <a:r>
+              <a:rPr lang="de-DE" b="0" i="0" dirty="0">
+                <a:solidFill>
+                  <a:srgbClr val="374151"/>
+                </a:solidFill>
+                <a:effectLst/>
+                <a:latin typeface="Söhne"/>
+              </a:rPr>
+              <a:t>) und eine zum Veröffentlichen (publish). Beim Klicken auf die Schaltfläche „</a:t>
+            </a:r>
+            <a:r>
+              <a:rPr lang="de-DE" b="0" i="0" dirty="0" err="1">
+                <a:solidFill>
+                  <a:srgbClr val="374151"/>
+                </a:solidFill>
+                <a:effectLst/>
+                <a:latin typeface="Söhne"/>
+              </a:rPr>
+              <a:t>Subscribe</a:t>
+            </a:r>
+            <a:r>
+              <a:rPr lang="de-DE" b="0" i="0" dirty="0">
+                <a:solidFill>
+                  <a:srgbClr val="374151"/>
+                </a:solidFill>
+                <a:effectLst/>
+                <a:latin typeface="Söhne"/>
+              </a:rPr>
+              <a:t>" wird geprüft, ob der Benutzername bereits in der Liste der Abonnenten enthalten ist. Wenn nicht, wird der Benutzername zur Liste hinzugefügt. Wenn der Benutzername bereits in der Liste vorhanden ist, wird er aus der Liste entfernt und eine Meldung „</a:t>
+            </a:r>
+            <a:r>
+              <a:rPr lang="de-DE" b="0" i="0" dirty="0" err="1">
+                <a:solidFill>
+                  <a:srgbClr val="374151"/>
+                </a:solidFill>
+                <a:effectLst/>
+                <a:latin typeface="Söhne"/>
+              </a:rPr>
+              <a:t>Unsubscribed</a:t>
+            </a:r>
+            <a:r>
+              <a:rPr lang="de-DE" b="0" i="0" dirty="0">
+                <a:solidFill>
+                  <a:srgbClr val="374151"/>
+                </a:solidFill>
+                <a:effectLst/>
+                <a:latin typeface="Söhne"/>
+              </a:rPr>
+              <a:t>" angezeigt. Beim Klicken auf die Schaltfläche "Veröffentlichen" soll ein Abonnent die Möglichkeit haben, ein Bild zu einer  Stadt hochzuladen und anschließend werden alle Abonnenten in der Liste benachrichtigt. Wenn ein User nicht </a:t>
+            </a:r>
+            <a:r>
+              <a:rPr lang="de-DE" b="0" i="0" dirty="0" err="1">
+                <a:solidFill>
+                  <a:srgbClr val="374151"/>
+                </a:solidFill>
+                <a:effectLst/>
+                <a:latin typeface="Söhne"/>
+              </a:rPr>
+              <a:t>subscribed</a:t>
+            </a:r>
+            <a:r>
+              <a:rPr lang="de-DE" b="0" i="0" dirty="0">
+                <a:solidFill>
+                  <a:srgbClr val="374151"/>
+                </a:solidFill>
+                <a:effectLst/>
+                <a:latin typeface="Söhne"/>
+              </a:rPr>
+              <a:t> ist, hat er nicht die Möglichkeit, ein Bild zu einer </a:t>
+            </a:r>
+            <a:r>
+              <a:rPr lang="de-DE" b="0" i="0">
+                <a:solidFill>
+                  <a:srgbClr val="374151"/>
+                </a:solidFill>
+                <a:effectLst/>
+                <a:latin typeface="Söhne"/>
+              </a:rPr>
+              <a:t>Stadt hochzuladen.</a:t>
+            </a:r>
+            <a:endParaRPr lang="de-DE" dirty="0"/>
+          </a:p>
+          <a:p>
             <a:endParaRPr lang="de-DE" dirty="0"/>
           </a:p>
         </p:txBody>
@@ -1215,7 +1368,7 @@
     </p:spTree>
     <p:extLst>
       <p:ext uri="{BB962C8B-B14F-4D97-AF65-F5344CB8AC3E}">
-        <p14:creationId xmlns:p14="http://schemas.microsoft.com/office/powerpoint/2010/main" val="3745376474"/>
+        <p14:creationId xmlns:p14="http://schemas.microsoft.com/office/powerpoint/2010/main" val="2321389857"/>
       </p:ext>
     </p:extLst>
   </p:cSld>
@@ -1299,7 +1452,7 @@
     </p:spTree>
     <p:extLst>
       <p:ext uri="{BB962C8B-B14F-4D97-AF65-F5344CB8AC3E}">
-        <p14:creationId xmlns:p14="http://schemas.microsoft.com/office/powerpoint/2010/main" val="1653405182"/>
+        <p14:creationId xmlns:p14="http://schemas.microsoft.com/office/powerpoint/2010/main" val="3745376474"/>
       </p:ext>
     </p:extLst>
   </p:cSld>
@@ -1383,7 +1536,7 @@
     </p:spTree>
     <p:extLst>
       <p:ext uri="{BB962C8B-B14F-4D97-AF65-F5344CB8AC3E}">
-        <p14:creationId xmlns:p14="http://schemas.microsoft.com/office/powerpoint/2010/main" val="2618932596"/>
+        <p14:creationId xmlns:p14="http://schemas.microsoft.com/office/powerpoint/2010/main" val="1653405182"/>
       </p:ext>
     </p:extLst>
   </p:cSld>
@@ -1792,7 +1945,7 @@
           <a:p>
             <a:fld id="{ED1BC4C9-1A13-4EE7-AF10-A080FF9505FC}" type="datetime1">
               <a:rPr lang="de-DE" smtClean="0"/>
-              <a:t>11.01.2023</a:t>
+              <a:t>12.01.2023</a:t>
             </a:fld>
             <a:endParaRPr lang="de-DE"/>
           </a:p>
@@ -1990,7 +2143,7 @@
           <a:p>
             <a:fld id="{6C2AB422-32FC-42F3-9689-2B0D08DB4456}" type="datetime1">
               <a:rPr lang="de-DE" smtClean="0"/>
-              <a:t>11.01.2023</a:t>
+              <a:t>12.01.2023</a:t>
             </a:fld>
             <a:endParaRPr lang="de-DE"/>
           </a:p>
@@ -2198,7 +2351,7 @@
           <a:p>
             <a:fld id="{C1537AD8-4C02-4B23-A319-CD41525F0575}" type="datetime1">
               <a:rPr lang="de-DE" smtClean="0"/>
-              <a:t>11.01.2023</a:t>
+              <a:t>12.01.2023</a:t>
             </a:fld>
             <a:endParaRPr lang="de-DE"/>
           </a:p>
@@ -2396,7 +2549,7 @@
           <a:p>
             <a:fld id="{2542ACB1-0C11-4D97-B345-5791D5AFEBBD}" type="datetime1">
               <a:rPr lang="de-DE" smtClean="0"/>
-              <a:t>11.01.2023</a:t>
+              <a:t>12.01.2023</a:t>
             </a:fld>
             <a:endParaRPr lang="de-DE"/>
           </a:p>
@@ -2671,7 +2824,7 @@
           <a:p>
             <a:fld id="{CF8A9434-0CF4-4502-AC01-E50C47A78749}" type="datetime1">
               <a:rPr lang="de-DE" smtClean="0"/>
-              <a:t>11.01.2023</a:t>
+              <a:t>12.01.2023</a:t>
             </a:fld>
             <a:endParaRPr lang="de-DE"/>
           </a:p>
@@ -2936,7 +3089,7 @@
           <a:p>
             <a:fld id="{1C66BAD7-5AD9-4620-853F-EAED5CE5CCA9}" type="datetime1">
               <a:rPr lang="de-DE" smtClean="0"/>
-              <a:t>11.01.2023</a:t>
+              <a:t>12.01.2023</a:t>
             </a:fld>
             <a:endParaRPr lang="de-DE"/>
           </a:p>
@@ -3353,7 +3506,7 @@
           <a:p>
             <a:fld id="{F97251B6-C000-4B8B-8F25-F55B863C7B50}" type="datetime1">
               <a:rPr lang="de-DE" smtClean="0"/>
-              <a:t>11.01.2023</a:t>
+              <a:t>12.01.2023</a:t>
             </a:fld>
             <a:endParaRPr lang="de-DE"/>
           </a:p>
@@ -3499,7 +3652,7 @@
           <a:p>
             <a:fld id="{D7BA6ECB-C460-4FAF-AB91-F9078068F532}" type="datetime1">
               <a:rPr lang="de-DE" smtClean="0"/>
-              <a:t>11.01.2023</a:t>
+              <a:t>12.01.2023</a:t>
             </a:fld>
             <a:endParaRPr lang="de-DE"/>
           </a:p>
@@ -3612,7 +3765,7 @@
           <a:p>
             <a:fld id="{D1F6BFF4-EBC5-41EE-80C5-C44105A7A9B4}" type="datetime1">
               <a:rPr lang="de-DE" smtClean="0"/>
-              <a:t>11.01.2023</a:t>
+              <a:t>12.01.2023</a:t>
             </a:fld>
             <a:endParaRPr lang="de-DE"/>
           </a:p>
@@ -3923,7 +4076,7 @@
           <a:p>
             <a:fld id="{FEDC9D51-5166-4312-BA3B-571CE0B8ECE6}" type="datetime1">
               <a:rPr lang="de-DE" smtClean="0"/>
-              <a:t>11.01.2023</a:t>
+              <a:t>12.01.2023</a:t>
             </a:fld>
             <a:endParaRPr lang="de-DE"/>
           </a:p>
@@ -4216,7 +4369,7 @@
           <a:p>
             <a:fld id="{0D75F604-7643-422C-9716-5D15F8DAA7CB}" type="datetime1">
               <a:rPr lang="de-DE" smtClean="0"/>
-              <a:t>11.01.2023</a:t>
+              <a:t>12.01.2023</a:t>
             </a:fld>
             <a:endParaRPr lang="de-DE"/>
           </a:p>
@@ -4499,7 +4652,7 @@
           <a:p>
             <a:fld id="{EAE11A2B-C0F6-4A44-84BB-6682D02704B4}" type="datetime1">
               <a:rPr lang="de-DE" smtClean="0"/>
-              <a:t>11.01.2023</a:t>
+              <a:t>12.01.2023</a:t>
             </a:fld>
             <a:endParaRPr lang="de-DE"/>
           </a:p>
@@ -5814,6 +5967,826 @@
             <a:pPr algn="ctr"/>
             <a:r>
               <a:rPr lang="de-DE" dirty="0"/>
+              <a:t>POC Bildaufruf/-abruf</a:t>
+            </a:r>
+          </a:p>
+        </p:txBody>
+      </p:sp>
+      <p:sp>
+        <p:nvSpPr>
+          <p:cNvPr id="3" name="Inhaltsplatzhalter 2">
+            <a:extLst>
+              <a:ext uri="{FF2B5EF4-FFF2-40B4-BE49-F238E27FC236}">
+                <a16:creationId xmlns:a16="http://schemas.microsoft.com/office/drawing/2014/main" id="{26828B3D-0288-9D01-3FAB-ED2A638AE90B}"/>
+              </a:ext>
+            </a:extLst>
+          </p:cNvPr>
+          <p:cNvSpPr>
+            <a:spLocks noGrp="1"/>
+          </p:cNvSpPr>
+          <p:nvPr>
+            <p:ph sz="half" idx="1"/>
+          </p:nvPr>
+        </p:nvSpPr>
+        <p:spPr>
+          <a:xfrm>
+            <a:off x="838200" y="1825625"/>
+            <a:ext cx="5181600" cy="4769728"/>
+          </a:xfrm>
+        </p:spPr>
+        <p:txBody>
+          <a:bodyPr>
+            <a:normAutofit fontScale="92500" lnSpcReduction="20000"/>
+          </a:bodyPr>
+          <a:lstStyle/>
+          <a:p>
+            <a:pPr marL="342900" lvl="0" indent="-342900">
+              <a:lnSpc>
+                <a:spcPct val="107000"/>
+              </a:lnSpc>
+              <a:buFont typeface="Symbol" panose="05050102010706020507" pitchFamily="18" charset="2"/>
+              <a:buChar char=""/>
+            </a:pPr>
+            <a:r>
+              <a:rPr lang="de-DE" sz="1200" u="sng" dirty="0">
+                <a:effectLst/>
+                <a:latin typeface="Calibri" panose="020F0502020204030204" pitchFamily="34" charset="0"/>
+                <a:ea typeface="Yu Mincho" panose="02020400000000000000" pitchFamily="18" charset="-128"/>
+                <a:cs typeface="Times New Roman" panose="02020603050405020304" pitchFamily="18" charset="0"/>
+              </a:rPr>
+              <a:t>Upload eines Bildes</a:t>
+            </a:r>
+            <a:endParaRPr lang="de-DE" sz="1200" dirty="0">
+              <a:effectLst/>
+              <a:latin typeface="Calibri" panose="020F0502020204030204" pitchFamily="34" charset="0"/>
+              <a:ea typeface="Yu Mincho" panose="02020400000000000000" pitchFamily="18" charset="-128"/>
+              <a:cs typeface="Times New Roman" panose="02020603050405020304" pitchFamily="18" charset="0"/>
+            </a:endParaRPr>
+          </a:p>
+          <a:p>
+            <a:pPr marL="742950" lvl="1" indent="-285750">
+              <a:lnSpc>
+                <a:spcPct val="107000"/>
+              </a:lnSpc>
+              <a:buFont typeface="Courier New" panose="02070309020205020404" pitchFamily="49" charset="0"/>
+              <a:buChar char="o"/>
+            </a:pPr>
+            <a:r>
+              <a:rPr lang="de-DE" sz="1200" b="1" dirty="0">
+                <a:effectLst/>
+                <a:latin typeface="Calibri" panose="020F0502020204030204" pitchFamily="34" charset="0"/>
+                <a:ea typeface="Yu Mincho" panose="02020400000000000000" pitchFamily="18" charset="-128"/>
+                <a:cs typeface="Times New Roman" panose="02020603050405020304" pitchFamily="18" charset="0"/>
+              </a:rPr>
+              <a:t>Ablauf</a:t>
+            </a:r>
+            <a:endParaRPr lang="de-DE" sz="1200" dirty="0">
+              <a:effectLst/>
+              <a:latin typeface="Calibri" panose="020F0502020204030204" pitchFamily="34" charset="0"/>
+              <a:ea typeface="Yu Mincho" panose="02020400000000000000" pitchFamily="18" charset="-128"/>
+              <a:cs typeface="Times New Roman" panose="02020603050405020304" pitchFamily="18" charset="0"/>
+            </a:endParaRPr>
+          </a:p>
+          <a:p>
+            <a:pPr marL="1143000" lvl="2" indent="-228600">
+              <a:lnSpc>
+                <a:spcPct val="107000"/>
+              </a:lnSpc>
+              <a:buFont typeface="Wingdings" panose="05000000000000000000" pitchFamily="2" charset="2"/>
+              <a:buChar char=""/>
+            </a:pPr>
+            <a:r>
+              <a:rPr lang="de-DE" sz="1200" dirty="0">
+                <a:effectLst/>
+                <a:latin typeface="Calibri" panose="020F0502020204030204" pitchFamily="34" charset="0"/>
+                <a:ea typeface="Yu Mincho" panose="02020400000000000000" pitchFamily="18" charset="-128"/>
+                <a:cs typeface="Times New Roman" panose="02020603050405020304" pitchFamily="18" charset="0"/>
+              </a:rPr>
+              <a:t>Aufruf einer Upload Funktion</a:t>
+            </a:r>
+          </a:p>
+          <a:p>
+            <a:pPr marL="1143000" lvl="2" indent="-228600">
+              <a:lnSpc>
+                <a:spcPct val="107000"/>
+              </a:lnSpc>
+              <a:buFont typeface="Wingdings" panose="05000000000000000000" pitchFamily="2" charset="2"/>
+              <a:buChar char=""/>
+            </a:pPr>
+            <a:r>
+              <a:rPr lang="de-DE" sz="1200" dirty="0">
+                <a:effectLst/>
+                <a:latin typeface="Calibri" panose="020F0502020204030204" pitchFamily="34" charset="0"/>
+                <a:ea typeface="Yu Mincho" panose="02020400000000000000" pitchFamily="18" charset="-128"/>
+                <a:cs typeface="Times New Roman" panose="02020603050405020304" pitchFamily="18" charset="0"/>
+              </a:rPr>
+              <a:t>Auslesen des Bild mit Unterstützung gängiger Bildformate</a:t>
+            </a:r>
+          </a:p>
+          <a:p>
+            <a:pPr marL="1143000" lvl="2" indent="-228600">
+              <a:lnSpc>
+                <a:spcPct val="107000"/>
+              </a:lnSpc>
+              <a:buFont typeface="Wingdings" panose="05000000000000000000" pitchFamily="2" charset="2"/>
+              <a:buChar char=""/>
+            </a:pPr>
+            <a:r>
+              <a:rPr lang="de-DE" sz="1200" dirty="0">
+                <a:effectLst/>
+                <a:latin typeface="Calibri" panose="020F0502020204030204" pitchFamily="34" charset="0"/>
+                <a:ea typeface="Yu Mincho" panose="02020400000000000000" pitchFamily="18" charset="-128"/>
+                <a:cs typeface="Times New Roman" panose="02020603050405020304" pitchFamily="18" charset="0"/>
+              </a:rPr>
+              <a:t>Automatisches Auslesen der erforderlichen Metadaten</a:t>
+            </a:r>
+          </a:p>
+          <a:p>
+            <a:pPr marL="1143000" lvl="2" indent="-228600">
+              <a:lnSpc>
+                <a:spcPct val="107000"/>
+              </a:lnSpc>
+              <a:buFont typeface="Wingdings" panose="05000000000000000000" pitchFamily="2" charset="2"/>
+              <a:buChar char=""/>
+            </a:pPr>
+            <a:r>
+              <a:rPr lang="de-DE" sz="1200" dirty="0">
+                <a:effectLst/>
+                <a:latin typeface="Calibri" panose="020F0502020204030204" pitchFamily="34" charset="0"/>
+                <a:ea typeface="Yu Mincho" panose="02020400000000000000" pitchFamily="18" charset="-128"/>
+                <a:cs typeface="Times New Roman" panose="02020603050405020304" pitchFamily="18" charset="0"/>
+              </a:rPr>
+              <a:t>Erzeugen eines Bildobjekts mit Bild und Metadaten</a:t>
+            </a:r>
+          </a:p>
+          <a:p>
+            <a:pPr marL="1143000" lvl="2" indent="-228600">
+              <a:lnSpc>
+                <a:spcPct val="107000"/>
+              </a:lnSpc>
+              <a:buFont typeface="Wingdings" panose="05000000000000000000" pitchFamily="2" charset="2"/>
+              <a:buChar char=""/>
+            </a:pPr>
+            <a:r>
+              <a:rPr lang="de-DE" sz="1200" dirty="0">
+                <a:effectLst/>
+                <a:latin typeface="Calibri" panose="020F0502020204030204" pitchFamily="34" charset="0"/>
+                <a:ea typeface="Yu Mincho" panose="02020400000000000000" pitchFamily="18" charset="-128"/>
+                <a:cs typeface="Times New Roman" panose="02020603050405020304" pitchFamily="18" charset="0"/>
+              </a:rPr>
+              <a:t>Abspeichern des Bildobjekts</a:t>
+            </a:r>
+          </a:p>
+          <a:p>
+            <a:pPr marL="742950" lvl="1" indent="-285750">
+              <a:lnSpc>
+                <a:spcPct val="107000"/>
+              </a:lnSpc>
+              <a:buFont typeface="Courier New" panose="02070309020205020404" pitchFamily="49" charset="0"/>
+              <a:buChar char="o"/>
+            </a:pPr>
+            <a:r>
+              <a:rPr lang="de-DE" sz="1200" b="1" dirty="0">
+                <a:effectLst/>
+                <a:latin typeface="Calibri" panose="020F0502020204030204" pitchFamily="34" charset="0"/>
+                <a:ea typeface="Yu Mincho" panose="02020400000000000000" pitchFamily="18" charset="-128"/>
+                <a:cs typeface="Times New Roman" panose="02020603050405020304" pitchFamily="18" charset="0"/>
+              </a:rPr>
+              <a:t>Exit-Kriterien</a:t>
+            </a:r>
+            <a:endParaRPr lang="de-DE" sz="1200" dirty="0">
+              <a:effectLst/>
+              <a:latin typeface="Calibri" panose="020F0502020204030204" pitchFamily="34" charset="0"/>
+              <a:ea typeface="Yu Mincho" panose="02020400000000000000" pitchFamily="18" charset="-128"/>
+              <a:cs typeface="Times New Roman" panose="02020603050405020304" pitchFamily="18" charset="0"/>
+            </a:endParaRPr>
+          </a:p>
+          <a:p>
+            <a:pPr marL="1143000" lvl="2" indent="-228600">
+              <a:lnSpc>
+                <a:spcPct val="107000"/>
+              </a:lnSpc>
+              <a:buFont typeface="Wingdings" panose="05000000000000000000" pitchFamily="2" charset="2"/>
+              <a:buChar char=""/>
+            </a:pPr>
+            <a:r>
+              <a:rPr lang="de-DE" sz="1200" dirty="0">
+                <a:effectLst/>
+                <a:latin typeface="Calibri" panose="020F0502020204030204" pitchFamily="34" charset="0"/>
+                <a:ea typeface="Yu Mincho" panose="02020400000000000000" pitchFamily="18" charset="-128"/>
+                <a:cs typeface="Times New Roman" panose="02020603050405020304" pitchFamily="18" charset="0"/>
+              </a:rPr>
+              <a:t>Funktion konnte aufgerufen werden und Eingaben wurden erfolgreich und korrekt übernommen.</a:t>
+            </a:r>
+          </a:p>
+          <a:p>
+            <a:pPr marL="1143000" lvl="2" indent="-228600">
+              <a:lnSpc>
+                <a:spcPct val="107000"/>
+              </a:lnSpc>
+              <a:buFont typeface="Wingdings" panose="05000000000000000000" pitchFamily="2" charset="2"/>
+              <a:buChar char=""/>
+            </a:pPr>
+            <a:r>
+              <a:rPr lang="de-DE" sz="1200" dirty="0">
+                <a:effectLst/>
+                <a:latin typeface="Calibri" panose="020F0502020204030204" pitchFamily="34" charset="0"/>
+                <a:ea typeface="Yu Mincho" panose="02020400000000000000" pitchFamily="18" charset="-128"/>
+                <a:cs typeface="Times New Roman" panose="02020603050405020304" pitchFamily="18" charset="0"/>
+              </a:rPr>
+              <a:t>Bilddaten konnten erfolgreich geladen werden.</a:t>
+            </a:r>
+          </a:p>
+          <a:p>
+            <a:pPr marL="1143000" lvl="2" indent="-228600">
+              <a:lnSpc>
+                <a:spcPct val="107000"/>
+              </a:lnSpc>
+              <a:buFont typeface="Wingdings" panose="05000000000000000000" pitchFamily="2" charset="2"/>
+              <a:buChar char=""/>
+            </a:pPr>
+            <a:r>
+              <a:rPr lang="de-DE" sz="1200" dirty="0">
+                <a:effectLst/>
+                <a:latin typeface="Calibri" panose="020F0502020204030204" pitchFamily="34" charset="0"/>
+                <a:ea typeface="Yu Mincho" panose="02020400000000000000" pitchFamily="18" charset="-128"/>
+                <a:cs typeface="Times New Roman" panose="02020603050405020304" pitchFamily="18" charset="0"/>
+              </a:rPr>
+              <a:t>Neues Bildobjekt wurde erfolgreich erzeugt und abgespeichert.</a:t>
+            </a:r>
+          </a:p>
+          <a:p>
+            <a:pPr marL="742950" lvl="1" indent="-285750">
+              <a:lnSpc>
+                <a:spcPct val="107000"/>
+              </a:lnSpc>
+              <a:buFont typeface="Courier New" panose="02070309020205020404" pitchFamily="49" charset="0"/>
+              <a:buChar char="o"/>
+            </a:pPr>
+            <a:r>
+              <a:rPr lang="de-DE" sz="1200" b="1" dirty="0">
+                <a:effectLst/>
+                <a:latin typeface="Calibri" panose="020F0502020204030204" pitchFamily="34" charset="0"/>
+                <a:ea typeface="Yu Mincho" panose="02020400000000000000" pitchFamily="18" charset="-128"/>
+                <a:cs typeface="Times New Roman" panose="02020603050405020304" pitchFamily="18" charset="0"/>
+              </a:rPr>
+              <a:t>Fail-Kriterien</a:t>
+            </a:r>
+            <a:endParaRPr lang="de-DE" sz="1200" dirty="0">
+              <a:effectLst/>
+              <a:latin typeface="Calibri" panose="020F0502020204030204" pitchFamily="34" charset="0"/>
+              <a:ea typeface="Yu Mincho" panose="02020400000000000000" pitchFamily="18" charset="-128"/>
+              <a:cs typeface="Times New Roman" panose="02020603050405020304" pitchFamily="18" charset="0"/>
+            </a:endParaRPr>
+          </a:p>
+          <a:p>
+            <a:pPr marL="1143000" lvl="2" indent="-228600">
+              <a:lnSpc>
+                <a:spcPct val="107000"/>
+              </a:lnSpc>
+              <a:buFont typeface="Wingdings" panose="05000000000000000000" pitchFamily="2" charset="2"/>
+              <a:buChar char=""/>
+            </a:pPr>
+            <a:r>
+              <a:rPr lang="de-DE" sz="1200" dirty="0">
+                <a:effectLst/>
+                <a:latin typeface="Calibri" panose="020F0502020204030204" pitchFamily="34" charset="0"/>
+                <a:ea typeface="Yu Mincho" panose="02020400000000000000" pitchFamily="18" charset="-128"/>
+                <a:cs typeface="Times New Roman" panose="02020603050405020304" pitchFamily="18" charset="0"/>
+              </a:rPr>
+              <a:t>Bilddaten konnten gar nicht geladen werden</a:t>
+            </a:r>
+          </a:p>
+          <a:p>
+            <a:pPr marL="1143000" lvl="2" indent="-228600">
+              <a:lnSpc>
+                <a:spcPct val="107000"/>
+              </a:lnSpc>
+              <a:buFont typeface="Wingdings" panose="05000000000000000000" pitchFamily="2" charset="2"/>
+              <a:buChar char=""/>
+            </a:pPr>
+            <a:r>
+              <a:rPr lang="de-DE" sz="1200" dirty="0">
+                <a:effectLst/>
+                <a:latin typeface="Calibri" panose="020F0502020204030204" pitchFamily="34" charset="0"/>
+                <a:ea typeface="Yu Mincho" panose="02020400000000000000" pitchFamily="18" charset="-128"/>
+                <a:cs typeface="Times New Roman" panose="02020603050405020304" pitchFamily="18" charset="0"/>
+              </a:rPr>
+              <a:t>Nur begrenzte Bildformate konnten unterstützt werden</a:t>
+            </a:r>
+          </a:p>
+          <a:p>
+            <a:pPr marL="1143000" lvl="2" indent="-228600">
+              <a:lnSpc>
+                <a:spcPct val="107000"/>
+              </a:lnSpc>
+              <a:buFont typeface="Wingdings" panose="05000000000000000000" pitchFamily="2" charset="2"/>
+              <a:buChar char=""/>
+            </a:pPr>
+            <a:r>
+              <a:rPr lang="de-DE" sz="1200" dirty="0">
+                <a:effectLst/>
+                <a:latin typeface="Calibri" panose="020F0502020204030204" pitchFamily="34" charset="0"/>
+                <a:ea typeface="Yu Mincho" panose="02020400000000000000" pitchFamily="18" charset="-128"/>
+                <a:cs typeface="Times New Roman" panose="02020603050405020304" pitchFamily="18" charset="0"/>
+              </a:rPr>
+              <a:t>Neues Bildobjekt konnte nicht erzeugt werden</a:t>
+            </a:r>
+          </a:p>
+          <a:p>
+            <a:pPr marL="1143000" lvl="2" indent="-228600">
+              <a:lnSpc>
+                <a:spcPct val="107000"/>
+              </a:lnSpc>
+              <a:buFont typeface="Wingdings" panose="05000000000000000000" pitchFamily="2" charset="2"/>
+              <a:buChar char=""/>
+            </a:pPr>
+            <a:r>
+              <a:rPr lang="de-DE" sz="1200" dirty="0">
+                <a:effectLst/>
+                <a:latin typeface="Calibri" panose="020F0502020204030204" pitchFamily="34" charset="0"/>
+                <a:ea typeface="Yu Mincho" panose="02020400000000000000" pitchFamily="18" charset="-128"/>
+                <a:cs typeface="Times New Roman" panose="02020603050405020304" pitchFamily="18" charset="0"/>
+              </a:rPr>
+              <a:t>Bildobjekt konnte nicht abgespeichert werden</a:t>
+            </a:r>
+          </a:p>
+          <a:p>
+            <a:pPr marL="742950" lvl="1" indent="-285750">
+              <a:lnSpc>
+                <a:spcPct val="107000"/>
+              </a:lnSpc>
+              <a:buFont typeface="Courier New" panose="02070309020205020404" pitchFamily="49" charset="0"/>
+              <a:buChar char="o"/>
+            </a:pPr>
+            <a:r>
+              <a:rPr lang="de-DE" sz="1200" b="1" dirty="0" err="1">
+                <a:effectLst/>
+                <a:latin typeface="Calibri" panose="020F0502020204030204" pitchFamily="34" charset="0"/>
+                <a:ea typeface="Yu Mincho" panose="02020400000000000000" pitchFamily="18" charset="-128"/>
+                <a:cs typeface="Times New Roman" panose="02020603050405020304" pitchFamily="18" charset="0"/>
+              </a:rPr>
+              <a:t>Fallback</a:t>
+            </a:r>
+            <a:endParaRPr lang="de-DE" sz="1200" dirty="0">
+              <a:effectLst/>
+              <a:latin typeface="Calibri" panose="020F0502020204030204" pitchFamily="34" charset="0"/>
+              <a:ea typeface="Yu Mincho" panose="02020400000000000000" pitchFamily="18" charset="-128"/>
+              <a:cs typeface="Times New Roman" panose="02020603050405020304" pitchFamily="18" charset="0"/>
+            </a:endParaRPr>
+          </a:p>
+          <a:p>
+            <a:pPr marL="1143000" lvl="2" indent="-228600">
+              <a:lnSpc>
+                <a:spcPct val="107000"/>
+              </a:lnSpc>
+              <a:buFont typeface="Wingdings" panose="05000000000000000000" pitchFamily="2" charset="2"/>
+              <a:buChar char=""/>
+            </a:pPr>
+            <a:r>
+              <a:rPr lang="de-DE" sz="1200" dirty="0">
+                <a:effectLst/>
+                <a:latin typeface="Calibri" panose="020F0502020204030204" pitchFamily="34" charset="0"/>
+                <a:ea typeface="Yu Mincho" panose="02020400000000000000" pitchFamily="18" charset="-128"/>
+                <a:cs typeface="Times New Roman" panose="02020603050405020304" pitchFamily="18" charset="0"/>
+              </a:rPr>
+              <a:t>Aus Eindeutige Fehlermeldung wenn technische Fehler bei der Ausführung der Upload Funktion erfolgen</a:t>
+            </a:r>
+          </a:p>
+          <a:p>
+            <a:pPr marL="1143000" lvl="2" indent="-228600">
+              <a:lnSpc>
+                <a:spcPct val="107000"/>
+              </a:lnSpc>
+              <a:buFont typeface="Wingdings" panose="05000000000000000000" pitchFamily="2" charset="2"/>
+              <a:buChar char=""/>
+            </a:pPr>
+            <a:r>
+              <a:rPr lang="de-DE" sz="1200" dirty="0">
+                <a:effectLst/>
+                <a:latin typeface="Calibri" panose="020F0502020204030204" pitchFamily="34" charset="0"/>
+                <a:ea typeface="Yu Mincho" panose="02020400000000000000" pitchFamily="18" charset="-128"/>
+                <a:cs typeface="Times New Roman" panose="02020603050405020304" pitchFamily="18" charset="0"/>
+              </a:rPr>
+              <a:t>Bild wird ohne Metadaten gespeichert</a:t>
+            </a:r>
+          </a:p>
+          <a:p>
+            <a:pPr marL="1143000" lvl="2" indent="-228600">
+              <a:lnSpc>
+                <a:spcPct val="107000"/>
+              </a:lnSpc>
+              <a:spcAft>
+                <a:spcPts val="800"/>
+              </a:spcAft>
+              <a:buFont typeface="Wingdings" panose="05000000000000000000" pitchFamily="2" charset="2"/>
+              <a:buChar char=""/>
+            </a:pPr>
+            <a:r>
+              <a:rPr lang="de-DE" sz="1200" dirty="0">
+                <a:effectLst/>
+                <a:latin typeface="Calibri" panose="020F0502020204030204" pitchFamily="34" charset="0"/>
+                <a:ea typeface="Yu Mincho" panose="02020400000000000000" pitchFamily="18" charset="-128"/>
+                <a:cs typeface="Times New Roman" panose="02020603050405020304" pitchFamily="18" charset="0"/>
+              </a:rPr>
+              <a:t>Es werden begrenzte Bildformate gefordert</a:t>
+            </a:r>
+            <a:endParaRPr lang="de-DE" sz="1200" dirty="0">
+              <a:effectLst/>
+              <a:latin typeface="Calibri" panose="020F0502020204030204" pitchFamily="34" charset="0"/>
+              <a:ea typeface="Calibri" panose="020F0502020204030204" pitchFamily="34" charset="0"/>
+              <a:cs typeface="Times New Roman" panose="02020603050405020304" pitchFamily="18" charset="0"/>
+            </a:endParaRPr>
+          </a:p>
+        </p:txBody>
+      </p:sp>
+      <p:sp>
+        <p:nvSpPr>
+          <p:cNvPr id="6" name="Inhaltsplatzhalter 5">
+            <a:extLst>
+              <a:ext uri="{FF2B5EF4-FFF2-40B4-BE49-F238E27FC236}">
+                <a16:creationId xmlns:a16="http://schemas.microsoft.com/office/drawing/2014/main" id="{D27F10EA-731C-BC21-64B1-413E86CA7C17}"/>
+              </a:ext>
+            </a:extLst>
+          </p:cNvPr>
+          <p:cNvSpPr>
+            <a:spLocks noGrp="1"/>
+          </p:cNvSpPr>
+          <p:nvPr>
+            <p:ph sz="half" idx="2"/>
+          </p:nvPr>
+        </p:nvSpPr>
+        <p:spPr>
+          <a:xfrm>
+            <a:off x="6172200" y="1825625"/>
+            <a:ext cx="5181600" cy="4769728"/>
+          </a:xfrm>
+        </p:spPr>
+        <p:txBody>
+          <a:bodyPr anchor="t" anchorCtr="0">
+            <a:normAutofit fontScale="92500" lnSpcReduction="20000"/>
+          </a:bodyPr>
+          <a:lstStyle/>
+          <a:p>
+            <a:pPr marL="342900" lvl="0" indent="-342900">
+              <a:lnSpc>
+                <a:spcPct val="107000"/>
+              </a:lnSpc>
+              <a:buFont typeface="Symbol" panose="05050102010706020507" pitchFamily="18" charset="2"/>
+              <a:buChar char=""/>
+            </a:pPr>
+            <a:r>
+              <a:rPr lang="de-DE" sz="1100" u="sng" dirty="0">
+                <a:effectLst/>
+                <a:latin typeface="Calibri" panose="020F0502020204030204" pitchFamily="34" charset="0"/>
+                <a:ea typeface="Yu Mincho" panose="02020400000000000000" pitchFamily="18" charset="-128"/>
+                <a:cs typeface="Times New Roman" panose="02020603050405020304" pitchFamily="18" charset="0"/>
+              </a:rPr>
+              <a:t>Aufruf eines gespeicherten Bildes</a:t>
+            </a:r>
+            <a:endParaRPr lang="de-DE" sz="1100" dirty="0">
+              <a:effectLst/>
+              <a:latin typeface="Calibri" panose="020F0502020204030204" pitchFamily="34" charset="0"/>
+              <a:ea typeface="Yu Mincho" panose="02020400000000000000" pitchFamily="18" charset="-128"/>
+              <a:cs typeface="Times New Roman" panose="02020603050405020304" pitchFamily="18" charset="0"/>
+            </a:endParaRPr>
+          </a:p>
+          <a:p>
+            <a:pPr marL="742950" lvl="1" indent="-285750">
+              <a:lnSpc>
+                <a:spcPct val="107000"/>
+              </a:lnSpc>
+              <a:buFont typeface="Courier New" panose="02070309020205020404" pitchFamily="49" charset="0"/>
+              <a:buChar char="o"/>
+            </a:pPr>
+            <a:r>
+              <a:rPr lang="de-DE" sz="1100" b="1" dirty="0">
+                <a:effectLst/>
+                <a:latin typeface="Calibri" panose="020F0502020204030204" pitchFamily="34" charset="0"/>
+                <a:ea typeface="Yu Mincho" panose="02020400000000000000" pitchFamily="18" charset="-128"/>
+                <a:cs typeface="Times New Roman" panose="02020603050405020304" pitchFamily="18" charset="0"/>
+              </a:rPr>
+              <a:t>Ablauf</a:t>
+            </a:r>
+            <a:endParaRPr lang="de-DE" sz="1100" dirty="0">
+              <a:effectLst/>
+              <a:latin typeface="Calibri" panose="020F0502020204030204" pitchFamily="34" charset="0"/>
+              <a:ea typeface="Yu Mincho" panose="02020400000000000000" pitchFamily="18" charset="-128"/>
+              <a:cs typeface="Times New Roman" panose="02020603050405020304" pitchFamily="18" charset="0"/>
+            </a:endParaRPr>
+          </a:p>
+          <a:p>
+            <a:pPr marL="1143000" lvl="2" indent="-228600">
+              <a:lnSpc>
+                <a:spcPct val="107000"/>
+              </a:lnSpc>
+              <a:buFont typeface="Wingdings" panose="05000000000000000000" pitchFamily="2" charset="2"/>
+              <a:buChar char=""/>
+            </a:pPr>
+            <a:r>
+              <a:rPr lang="de-DE" sz="1100" dirty="0">
+                <a:effectLst/>
+                <a:latin typeface="Calibri" panose="020F0502020204030204" pitchFamily="34" charset="0"/>
+                <a:ea typeface="Yu Mincho" panose="02020400000000000000" pitchFamily="18" charset="-128"/>
+                <a:cs typeface="Times New Roman" panose="02020603050405020304" pitchFamily="18" charset="0"/>
+              </a:rPr>
+              <a:t>Bild wird aus persistentem Speicher geladen</a:t>
+            </a:r>
+          </a:p>
+          <a:p>
+            <a:pPr marL="1143000" lvl="2" indent="-228600">
+              <a:lnSpc>
+                <a:spcPct val="107000"/>
+              </a:lnSpc>
+              <a:buFont typeface="Wingdings" panose="05000000000000000000" pitchFamily="2" charset="2"/>
+              <a:buChar char=""/>
+            </a:pPr>
+            <a:r>
+              <a:rPr lang="de-DE" sz="1100" dirty="0">
+                <a:effectLst/>
+                <a:latin typeface="Calibri" panose="020F0502020204030204" pitchFamily="34" charset="0"/>
+                <a:ea typeface="Yu Mincho" panose="02020400000000000000" pitchFamily="18" charset="-128"/>
+                <a:cs typeface="Times New Roman" panose="02020603050405020304" pitchFamily="18" charset="0"/>
+              </a:rPr>
+              <a:t>Ansicht des Bildobjekts erzeugen</a:t>
+            </a:r>
+          </a:p>
+          <a:p>
+            <a:pPr marL="742950" lvl="1" indent="-285750">
+              <a:lnSpc>
+                <a:spcPct val="107000"/>
+              </a:lnSpc>
+              <a:buFont typeface="Courier New" panose="02070309020205020404" pitchFamily="49" charset="0"/>
+              <a:buChar char="o"/>
+            </a:pPr>
+            <a:r>
+              <a:rPr lang="de-DE" sz="1100" b="1" dirty="0">
+                <a:effectLst/>
+                <a:latin typeface="Calibri" panose="020F0502020204030204" pitchFamily="34" charset="0"/>
+                <a:ea typeface="Yu Mincho" panose="02020400000000000000" pitchFamily="18" charset="-128"/>
+                <a:cs typeface="Times New Roman" panose="02020603050405020304" pitchFamily="18" charset="0"/>
+              </a:rPr>
+              <a:t>Exit-Kriterien</a:t>
+            </a:r>
+            <a:endParaRPr lang="de-DE" sz="1100" dirty="0">
+              <a:effectLst/>
+              <a:latin typeface="Calibri" panose="020F0502020204030204" pitchFamily="34" charset="0"/>
+              <a:ea typeface="Yu Mincho" panose="02020400000000000000" pitchFamily="18" charset="-128"/>
+              <a:cs typeface="Times New Roman" panose="02020603050405020304" pitchFamily="18" charset="0"/>
+            </a:endParaRPr>
+          </a:p>
+          <a:p>
+            <a:pPr marL="1143000" lvl="2" indent="-228600">
+              <a:lnSpc>
+                <a:spcPct val="107000"/>
+              </a:lnSpc>
+              <a:buFont typeface="Wingdings" panose="05000000000000000000" pitchFamily="2" charset="2"/>
+              <a:buChar char=""/>
+            </a:pPr>
+            <a:r>
+              <a:rPr lang="de-DE" sz="1100" dirty="0">
+                <a:effectLst/>
+                <a:latin typeface="Calibri" panose="020F0502020204030204" pitchFamily="34" charset="0"/>
+                <a:ea typeface="Yu Mincho" panose="02020400000000000000" pitchFamily="18" charset="-128"/>
+                <a:cs typeface="Times New Roman" panose="02020603050405020304" pitchFamily="18" charset="0"/>
+              </a:rPr>
+              <a:t>Bild wurde erfolgreich aus persistentem Speicher geladen</a:t>
+            </a:r>
+          </a:p>
+          <a:p>
+            <a:pPr marL="1143000" lvl="2" indent="-228600">
+              <a:lnSpc>
+                <a:spcPct val="107000"/>
+              </a:lnSpc>
+              <a:buFont typeface="Wingdings" panose="05000000000000000000" pitchFamily="2" charset="2"/>
+              <a:buChar char=""/>
+            </a:pPr>
+            <a:r>
+              <a:rPr lang="de-DE" sz="1100" dirty="0">
+                <a:effectLst/>
+                <a:latin typeface="Calibri" panose="020F0502020204030204" pitchFamily="34" charset="0"/>
+                <a:ea typeface="Yu Mincho" panose="02020400000000000000" pitchFamily="18" charset="-128"/>
+                <a:cs typeface="Times New Roman" panose="02020603050405020304" pitchFamily="18" charset="0"/>
+              </a:rPr>
+              <a:t>Ansicht wurde erfolgreich erzeugt.</a:t>
+            </a:r>
+          </a:p>
+          <a:p>
+            <a:pPr marL="742950" lvl="1" indent="-285750">
+              <a:lnSpc>
+                <a:spcPct val="107000"/>
+              </a:lnSpc>
+              <a:buFont typeface="Courier New" panose="02070309020205020404" pitchFamily="49" charset="0"/>
+              <a:buChar char="o"/>
+            </a:pPr>
+            <a:r>
+              <a:rPr lang="de-DE" sz="1100" b="1" dirty="0">
+                <a:effectLst/>
+                <a:latin typeface="Calibri" panose="020F0502020204030204" pitchFamily="34" charset="0"/>
+                <a:ea typeface="Yu Mincho" panose="02020400000000000000" pitchFamily="18" charset="-128"/>
+                <a:cs typeface="Times New Roman" panose="02020603050405020304" pitchFamily="18" charset="0"/>
+              </a:rPr>
+              <a:t>Fail-Kriterien</a:t>
+            </a:r>
+            <a:endParaRPr lang="de-DE" sz="1100" dirty="0">
+              <a:effectLst/>
+              <a:latin typeface="Calibri" panose="020F0502020204030204" pitchFamily="34" charset="0"/>
+              <a:ea typeface="Yu Mincho" panose="02020400000000000000" pitchFamily="18" charset="-128"/>
+              <a:cs typeface="Times New Roman" panose="02020603050405020304" pitchFamily="18" charset="0"/>
+            </a:endParaRPr>
+          </a:p>
+          <a:p>
+            <a:pPr marL="1143000" lvl="2" indent="-228600">
+              <a:lnSpc>
+                <a:spcPct val="107000"/>
+              </a:lnSpc>
+              <a:buFont typeface="Wingdings" panose="05000000000000000000" pitchFamily="2" charset="2"/>
+              <a:buChar char=""/>
+            </a:pPr>
+            <a:r>
+              <a:rPr lang="de-DE" sz="1100" dirty="0">
+                <a:effectLst/>
+                <a:latin typeface="Calibri" panose="020F0502020204030204" pitchFamily="34" charset="0"/>
+                <a:ea typeface="Yu Mincho" panose="02020400000000000000" pitchFamily="18" charset="-128"/>
+                <a:cs typeface="Times New Roman" panose="02020603050405020304" pitchFamily="18" charset="0"/>
+              </a:rPr>
+              <a:t>Bild wurde nicht aus persistentem Speicher geladen</a:t>
+            </a:r>
+          </a:p>
+          <a:p>
+            <a:pPr marL="1143000" lvl="2" indent="-228600">
+              <a:lnSpc>
+                <a:spcPct val="107000"/>
+              </a:lnSpc>
+              <a:buFont typeface="Wingdings" panose="05000000000000000000" pitchFamily="2" charset="2"/>
+              <a:buChar char=""/>
+            </a:pPr>
+            <a:r>
+              <a:rPr lang="de-DE" sz="1100" dirty="0">
+                <a:effectLst/>
+                <a:latin typeface="Calibri" panose="020F0502020204030204" pitchFamily="34" charset="0"/>
+                <a:ea typeface="Yu Mincho" panose="02020400000000000000" pitchFamily="18" charset="-128"/>
+                <a:cs typeface="Times New Roman" panose="02020603050405020304" pitchFamily="18" charset="0"/>
+              </a:rPr>
+              <a:t>Ansicht wurde nicht erzeugt</a:t>
+            </a:r>
+          </a:p>
+          <a:p>
+            <a:pPr marL="742950" lvl="1" indent="-285750">
+              <a:lnSpc>
+                <a:spcPct val="107000"/>
+              </a:lnSpc>
+              <a:buFont typeface="Courier New" panose="02070309020205020404" pitchFamily="49" charset="0"/>
+              <a:buChar char="o"/>
+            </a:pPr>
+            <a:r>
+              <a:rPr lang="de-DE" sz="1100" b="1" dirty="0" err="1">
+                <a:effectLst/>
+                <a:latin typeface="Calibri" panose="020F0502020204030204" pitchFamily="34" charset="0"/>
+                <a:ea typeface="Yu Mincho" panose="02020400000000000000" pitchFamily="18" charset="-128"/>
+                <a:cs typeface="Times New Roman" panose="02020603050405020304" pitchFamily="18" charset="0"/>
+              </a:rPr>
+              <a:t>Fallback</a:t>
+            </a:r>
+            <a:endParaRPr lang="de-DE" sz="1100" dirty="0">
+              <a:effectLst/>
+              <a:latin typeface="Calibri" panose="020F0502020204030204" pitchFamily="34" charset="0"/>
+              <a:ea typeface="Yu Mincho" panose="02020400000000000000" pitchFamily="18" charset="-128"/>
+              <a:cs typeface="Times New Roman" panose="02020603050405020304" pitchFamily="18" charset="0"/>
+            </a:endParaRPr>
+          </a:p>
+          <a:p>
+            <a:pPr marL="1143000" lvl="2" indent="-228600">
+              <a:lnSpc>
+                <a:spcPct val="107000"/>
+              </a:lnSpc>
+              <a:buFont typeface="Wingdings" panose="05000000000000000000" pitchFamily="2" charset="2"/>
+              <a:buChar char=""/>
+            </a:pPr>
+            <a:r>
+              <a:rPr lang="de-DE" sz="1100" dirty="0">
+                <a:effectLst/>
+                <a:latin typeface="Calibri" panose="020F0502020204030204" pitchFamily="34" charset="0"/>
+                <a:ea typeface="Yu Mincho" panose="02020400000000000000" pitchFamily="18" charset="-128"/>
+                <a:cs typeface="Times New Roman" panose="02020603050405020304" pitchFamily="18" charset="0"/>
+              </a:rPr>
+              <a:t>Eindeutige Fehlermeldung anzeigen</a:t>
+            </a:r>
+          </a:p>
+          <a:p>
+            <a:pPr marL="1143000" lvl="2" indent="-228600">
+              <a:lnSpc>
+                <a:spcPct val="107000"/>
+              </a:lnSpc>
+              <a:spcAft>
+                <a:spcPts val="800"/>
+              </a:spcAft>
+              <a:buFont typeface="Wingdings" panose="05000000000000000000" pitchFamily="2" charset="2"/>
+              <a:buChar char=""/>
+            </a:pPr>
+            <a:r>
+              <a:rPr lang="de-DE" sz="1100" dirty="0">
+                <a:effectLst/>
+                <a:latin typeface="Calibri" panose="020F0502020204030204" pitchFamily="34" charset="0"/>
+                <a:ea typeface="Yu Mincho" panose="02020400000000000000" pitchFamily="18" charset="-128"/>
+                <a:cs typeface="Times New Roman" panose="02020603050405020304" pitchFamily="18" charset="0"/>
+              </a:rPr>
+              <a:t>Aufforderung zum neu laden mitteilen</a:t>
+            </a:r>
+          </a:p>
+        </p:txBody>
+      </p:sp>
+      <p:sp>
+        <p:nvSpPr>
+          <p:cNvPr id="5" name="Foliennummernplatzhalter 4">
+            <a:extLst>
+              <a:ext uri="{FF2B5EF4-FFF2-40B4-BE49-F238E27FC236}">
+                <a16:creationId xmlns:a16="http://schemas.microsoft.com/office/drawing/2014/main" id="{7B246376-21DF-8BF4-A1FD-B77C22C28AAB}"/>
+              </a:ext>
+            </a:extLst>
+          </p:cNvPr>
+          <p:cNvSpPr>
+            <a:spLocks noGrp="1"/>
+          </p:cNvSpPr>
+          <p:nvPr>
+            <p:ph type="sldNum" sz="quarter" idx="12"/>
+          </p:nvPr>
+        </p:nvSpPr>
+        <p:spPr/>
+        <p:txBody>
+          <a:bodyPr/>
+          <a:lstStyle/>
+          <a:p>
+            <a:fld id="{4FD190AE-D9AE-4074-AAED-D637288AF7F0}" type="slidenum">
+              <a:rPr lang="de-DE" sz="2000" smtClean="0">
+                <a:solidFill>
+                  <a:schemeClr val="tx1"/>
+                </a:solidFill>
+              </a:rPr>
+              <a:t>3</a:t>
+            </a:fld>
+            <a:endParaRPr lang="de-DE" sz="2000" dirty="0">
+              <a:solidFill>
+                <a:schemeClr val="tx1"/>
+              </a:solidFill>
+            </a:endParaRPr>
+          </a:p>
+        </p:txBody>
+      </p:sp>
+    </p:spTree>
+    <p:extLst>
+      <p:ext uri="{BB962C8B-B14F-4D97-AF65-F5344CB8AC3E}">
+        <p14:creationId xmlns:p14="http://schemas.microsoft.com/office/powerpoint/2010/main" val="1195816902"/>
+      </p:ext>
+    </p:extLst>
+  </p:cSld>
+  <p:clrMapOvr>
+    <a:masterClrMapping/>
+  </p:clrMapOvr>
+</p:sld>
+</file>
+
+<file path=ppt/slides/slide4.xml><?xml version="1.0" encoding="utf-8"?>
+<p:sld xmlns:a="http://schemas.openxmlformats.org/drawingml/2006/main" xmlns:r="http://schemas.openxmlformats.org/officeDocument/2006/relationships" xmlns:p="http://schemas.openxmlformats.org/presentationml/2006/main">
+  <p:cSld>
+    <p:spTree>
+      <p:nvGrpSpPr>
+        <p:cNvPr id="1" name=""/>
+        <p:cNvGrpSpPr/>
+        <p:nvPr/>
+      </p:nvGrpSpPr>
+      <p:grpSpPr>
+        <a:xfrm>
+          <a:off x="0" y="0"/>
+          <a:ext cx="0" cy="0"/>
+          <a:chOff x="0" y="0"/>
+          <a:chExt cx="0" cy="0"/>
+        </a:xfrm>
+      </p:grpSpPr>
+      <p:sp>
+        <p:nvSpPr>
+          <p:cNvPr id="2" name="Titel 1">
+            <a:extLst>
+              <a:ext uri="{FF2B5EF4-FFF2-40B4-BE49-F238E27FC236}">
+                <a16:creationId xmlns:a16="http://schemas.microsoft.com/office/drawing/2014/main" id="{4AC7DED0-9976-693C-8B24-D84F23C8E7B6}"/>
+              </a:ext>
+            </a:extLst>
+          </p:cNvPr>
+          <p:cNvSpPr>
+            <a:spLocks noGrp="1"/>
+          </p:cNvSpPr>
+          <p:nvPr>
+            <p:ph type="title"/>
+          </p:nvPr>
+        </p:nvSpPr>
+        <p:spPr/>
+        <p:txBody>
+          <a:bodyPr/>
+          <a:lstStyle/>
+          <a:p>
+            <a:pPr algn="ctr"/>
+            <a:r>
+              <a:rPr lang="de-DE" dirty="0"/>
               <a:t>POC Pub/Sub</a:t>
             </a:r>
           </a:p>
@@ -6134,7 +7107,7 @@
                   <a:schemeClr val="tx1"/>
                 </a:solidFill>
               </a:rPr>
-              <a:t>3</a:t>
+              <a:t>4</a:t>
             </a:fld>
             <a:endParaRPr lang="de-DE" sz="2000" dirty="0">
               <a:solidFill>
@@ -6548,131 +7521,6 @@
 </p:sld>
 </file>
 
-<file path=ppt/slides/slide4.xml><?xml version="1.0" encoding="utf-8"?>
-<p:sld xmlns:a="http://schemas.openxmlformats.org/drawingml/2006/main" xmlns:r="http://schemas.openxmlformats.org/officeDocument/2006/relationships" xmlns:p="http://schemas.openxmlformats.org/presentationml/2006/main">
-  <p:cSld>
-    <p:spTree>
-      <p:nvGrpSpPr>
-        <p:cNvPr id="1" name=""/>
-        <p:cNvGrpSpPr/>
-        <p:nvPr/>
-      </p:nvGrpSpPr>
-      <p:grpSpPr>
-        <a:xfrm>
-          <a:off x="0" y="0"/>
-          <a:ext cx="0" cy="0"/>
-          <a:chOff x="0" y="0"/>
-          <a:chExt cx="0" cy="0"/>
-        </a:xfrm>
-      </p:grpSpPr>
-      <p:sp>
-        <p:nvSpPr>
-          <p:cNvPr id="2" name="Titel 1">
-            <a:extLst>
-              <a:ext uri="{FF2B5EF4-FFF2-40B4-BE49-F238E27FC236}">
-                <a16:creationId xmlns:a16="http://schemas.microsoft.com/office/drawing/2014/main" id="{4AC7DED0-9976-693C-8B24-D84F23C8E7B6}"/>
-              </a:ext>
-            </a:extLst>
-          </p:cNvPr>
-          <p:cNvSpPr>
-            <a:spLocks noGrp="1"/>
-          </p:cNvSpPr>
-          <p:nvPr>
-            <p:ph type="title"/>
-          </p:nvPr>
-        </p:nvSpPr>
-        <p:spPr/>
-        <p:txBody>
-          <a:bodyPr/>
-          <a:lstStyle/>
-          <a:p>
-            <a:r>
-              <a:rPr lang="de-DE" dirty="0"/>
-              <a:t>User-</a:t>
-            </a:r>
-            <a:r>
-              <a:rPr lang="de-DE" dirty="0" err="1"/>
-              <a:t>Profiles</a:t>
-            </a:r>
-            <a:endParaRPr lang="de-DE" dirty="0"/>
-          </a:p>
-        </p:txBody>
-      </p:sp>
-      <p:sp>
-        <p:nvSpPr>
-          <p:cNvPr id="3" name="Inhaltsplatzhalter 2">
-            <a:extLst>
-              <a:ext uri="{FF2B5EF4-FFF2-40B4-BE49-F238E27FC236}">
-                <a16:creationId xmlns:a16="http://schemas.microsoft.com/office/drawing/2014/main" id="{26828B3D-0288-9D01-3FAB-ED2A638AE90B}"/>
-              </a:ext>
-            </a:extLst>
-          </p:cNvPr>
-          <p:cNvSpPr>
-            <a:spLocks noGrp="1"/>
-          </p:cNvSpPr>
-          <p:nvPr>
-            <p:ph idx="1"/>
-          </p:nvPr>
-        </p:nvSpPr>
-        <p:spPr/>
-        <p:txBody>
-          <a:bodyPr/>
-          <a:lstStyle/>
-          <a:p>
-            <a:endParaRPr lang="de-DE" dirty="0"/>
-          </a:p>
-        </p:txBody>
-      </p:sp>
-      <p:sp>
-        <p:nvSpPr>
-          <p:cNvPr id="5" name="Foliennummernplatzhalter 4">
-            <a:extLst>
-              <a:ext uri="{FF2B5EF4-FFF2-40B4-BE49-F238E27FC236}">
-                <a16:creationId xmlns:a16="http://schemas.microsoft.com/office/drawing/2014/main" id="{7B246376-21DF-8BF4-A1FD-B77C22C28AAB}"/>
-              </a:ext>
-            </a:extLst>
-          </p:cNvPr>
-          <p:cNvSpPr>
-            <a:spLocks noGrp="1"/>
-          </p:cNvSpPr>
-          <p:nvPr>
-            <p:ph type="sldNum" sz="quarter" idx="12"/>
-          </p:nvPr>
-        </p:nvSpPr>
-        <p:spPr/>
-        <p:txBody>
-          <a:bodyPr/>
-          <a:lstStyle/>
-          <a:p>
-            <a:fld id="{4FD190AE-D9AE-4074-AAED-D637288AF7F0}" type="slidenum">
-              <a:rPr lang="de-DE" sz="2000" smtClean="0">
-                <a:solidFill>
-                  <a:schemeClr val="tx1"/>
-                </a:solidFill>
-              </a:rPr>
-              <a:t>4</a:t>
-            </a:fld>
-            <a:endParaRPr lang="de-DE" sz="2000" dirty="0">
-              <a:solidFill>
-                <a:schemeClr val="tx1"/>
-              </a:solidFill>
-            </a:endParaRPr>
-          </a:p>
-        </p:txBody>
-      </p:sp>
-    </p:spTree>
-    <p:extLst>
-      <p:ext uri="{BB962C8B-B14F-4D97-AF65-F5344CB8AC3E}">
-        <p14:creationId xmlns:p14="http://schemas.microsoft.com/office/powerpoint/2010/main" val="738318702"/>
-      </p:ext>
-    </p:extLst>
-  </p:cSld>
-  <p:clrMapOvr>
-    <a:masterClrMapping/>
-  </p:clrMapOvr>
-</p:sld>
-</file>
-
 <file path=ppt/slides/slide5.xml><?xml version="1.0" encoding="utf-8"?>
 <p:sld xmlns:a="http://schemas.openxmlformats.org/drawingml/2006/main" xmlns:r="http://schemas.openxmlformats.org/officeDocument/2006/relationships" xmlns:p="http://schemas.openxmlformats.org/presentationml/2006/main">
   <p:cSld>
@@ -6692,10 +7540,10 @@
       </p:grpSpPr>
       <p:sp>
         <p:nvSpPr>
-          <p:cNvPr id="3" name="Titel 2">
-            <a:extLst>
-              <a:ext uri="{FF2B5EF4-FFF2-40B4-BE49-F238E27FC236}">
-                <a16:creationId xmlns:a16="http://schemas.microsoft.com/office/drawing/2014/main" id="{53AD19EA-19FD-31C3-9A36-EC2C3ECA7425}"/>
+          <p:cNvPr id="2" name="Titel 1">
+            <a:extLst>
+              <a:ext uri="{FF2B5EF4-FFF2-40B4-BE49-F238E27FC236}">
+                <a16:creationId xmlns:a16="http://schemas.microsoft.com/office/drawing/2014/main" id="{4AC7DED0-9976-693C-8B24-D84F23C8E7B6}"/>
               </a:ext>
             </a:extLst>
           </p:cNvPr>
@@ -6713,17 +7561,22 @@
           <a:p>
             <a:r>
               <a:rPr lang="de-DE" dirty="0"/>
-              <a:t>Use-Cases</a:t>
-            </a:r>
-          </a:p>
-        </p:txBody>
-      </p:sp>
-      <p:sp>
-        <p:nvSpPr>
-          <p:cNvPr id="4" name="Inhaltsplatzhalter 3">
-            <a:extLst>
-              <a:ext uri="{FF2B5EF4-FFF2-40B4-BE49-F238E27FC236}">
-                <a16:creationId xmlns:a16="http://schemas.microsoft.com/office/drawing/2014/main" id="{43D36CD5-C13A-93D9-C18B-BCA6C25AEC2A}"/>
+              <a:t>User-</a:t>
+            </a:r>
+            <a:r>
+              <a:rPr lang="de-DE" dirty="0" err="1"/>
+              <a:t>Profiles</a:t>
+            </a:r>
+            <a:endParaRPr lang="de-DE" dirty="0"/>
+          </a:p>
+        </p:txBody>
+      </p:sp>
+      <p:sp>
+        <p:nvSpPr>
+          <p:cNvPr id="3" name="Inhaltsplatzhalter 2">
+            <a:extLst>
+              <a:ext uri="{FF2B5EF4-FFF2-40B4-BE49-F238E27FC236}">
+                <a16:creationId xmlns:a16="http://schemas.microsoft.com/office/drawing/2014/main" id="{26828B3D-0288-9D01-3FAB-ED2A638AE90B}"/>
               </a:ext>
             </a:extLst>
           </p:cNvPr>
@@ -6783,7 +7636,7 @@
     </p:spTree>
     <p:extLst>
       <p:ext uri="{BB962C8B-B14F-4D97-AF65-F5344CB8AC3E}">
-        <p14:creationId xmlns:p14="http://schemas.microsoft.com/office/powerpoint/2010/main" val="1602302725"/>
+        <p14:creationId xmlns:p14="http://schemas.microsoft.com/office/powerpoint/2010/main" val="738318702"/>
       </p:ext>
     </p:extLst>
   </p:cSld>
@@ -6812,10 +7665,10 @@
       </p:grpSpPr>
       <p:sp>
         <p:nvSpPr>
-          <p:cNvPr id="2" name="Titel 1">
-            <a:extLst>
-              <a:ext uri="{FF2B5EF4-FFF2-40B4-BE49-F238E27FC236}">
-                <a16:creationId xmlns:a16="http://schemas.microsoft.com/office/drawing/2014/main" id="{4AC7DED0-9976-693C-8B24-D84F23C8E7B6}"/>
+          <p:cNvPr id="3" name="Titel 2">
+            <a:extLst>
+              <a:ext uri="{FF2B5EF4-FFF2-40B4-BE49-F238E27FC236}">
+                <a16:creationId xmlns:a16="http://schemas.microsoft.com/office/drawing/2014/main" id="{53AD19EA-19FD-31C3-9A36-EC2C3ECA7425}"/>
               </a:ext>
             </a:extLst>
           </p:cNvPr>
@@ -6831,67 +7684,35 @@
           <a:bodyPr/>
           <a:lstStyle/>
           <a:p>
+            <a:r>
+              <a:rPr lang="de-DE" dirty="0"/>
+              <a:t>Use-Cases</a:t>
+            </a:r>
+          </a:p>
+        </p:txBody>
+      </p:sp>
+      <p:sp>
+        <p:nvSpPr>
+          <p:cNvPr id="4" name="Inhaltsplatzhalter 3">
+            <a:extLst>
+              <a:ext uri="{FF2B5EF4-FFF2-40B4-BE49-F238E27FC236}">
+                <a16:creationId xmlns:a16="http://schemas.microsoft.com/office/drawing/2014/main" id="{43D36CD5-C13A-93D9-C18B-BCA6C25AEC2A}"/>
+              </a:ext>
+            </a:extLst>
+          </p:cNvPr>
+          <p:cNvSpPr>
+            <a:spLocks noGrp="1"/>
+          </p:cNvSpPr>
+          <p:nvPr>
+            <p:ph idx="1"/>
+          </p:nvPr>
+        </p:nvSpPr>
+        <p:spPr/>
+        <p:txBody>
+          <a:bodyPr/>
+          <a:lstStyle/>
+          <a:p>
             <a:endParaRPr lang="de-DE" dirty="0"/>
-          </a:p>
-        </p:txBody>
-      </p:sp>
-      <p:sp>
-        <p:nvSpPr>
-          <p:cNvPr id="3" name="Inhaltsplatzhalter 2">
-            <a:extLst>
-              <a:ext uri="{FF2B5EF4-FFF2-40B4-BE49-F238E27FC236}">
-                <a16:creationId xmlns:a16="http://schemas.microsoft.com/office/drawing/2014/main" id="{26828B3D-0288-9D01-3FAB-ED2A638AE90B}"/>
-              </a:ext>
-            </a:extLst>
-          </p:cNvPr>
-          <p:cNvSpPr>
-            <a:spLocks noGrp="1"/>
-          </p:cNvSpPr>
-          <p:nvPr>
-            <p:ph idx="1"/>
-          </p:nvPr>
-        </p:nvSpPr>
-        <p:spPr/>
-        <p:txBody>
-          <a:bodyPr/>
-          <a:lstStyle/>
-          <a:p>
-            <a:endParaRPr lang="de-DE" sz="1800" dirty="0">
-              <a:latin typeface="Calibri" panose="020F0502020204030204" pitchFamily="34" charset="0"/>
-              <a:ea typeface="Calibri" panose="020F0502020204030204" pitchFamily="34" charset="0"/>
-              <a:cs typeface="Times New Roman" panose="02020603050405020304" pitchFamily="18" charset="0"/>
-            </a:endParaRPr>
-          </a:p>
-          <a:p>
-            <a:endParaRPr lang="de-DE" sz="1800" dirty="0">
-              <a:effectLst/>
-              <a:latin typeface="Calibri" panose="020F0502020204030204" pitchFamily="34" charset="0"/>
-              <a:ea typeface="Calibri" panose="020F0502020204030204" pitchFamily="34" charset="0"/>
-              <a:cs typeface="Times New Roman" panose="02020603050405020304" pitchFamily="18" charset="0"/>
-            </a:endParaRPr>
-          </a:p>
-          <a:p>
-            <a:endParaRPr lang="de-DE" sz="1800" dirty="0">
-              <a:latin typeface="Calibri" panose="020F0502020204030204" pitchFamily="34" charset="0"/>
-              <a:ea typeface="Calibri" panose="020F0502020204030204" pitchFamily="34" charset="0"/>
-              <a:cs typeface="Times New Roman" panose="02020603050405020304" pitchFamily="18" charset="0"/>
-            </a:endParaRPr>
-          </a:p>
-          <a:p>
-            <a:endParaRPr lang="de-DE" sz="1800" dirty="0">
-              <a:effectLst/>
-              <a:latin typeface="Calibri" panose="020F0502020204030204" pitchFamily="34" charset="0"/>
-              <a:ea typeface="Calibri" panose="020F0502020204030204" pitchFamily="34" charset="0"/>
-              <a:cs typeface="Times New Roman" panose="02020603050405020304" pitchFamily="18" charset="0"/>
-            </a:endParaRPr>
-          </a:p>
-          <a:p>
-            <a:endParaRPr lang="de-DE" sz="1800" dirty="0">
-              <a:effectLst/>
-              <a:latin typeface="Calibri" panose="020F0502020204030204" pitchFamily="34" charset="0"/>
-              <a:ea typeface="Calibri" panose="020F0502020204030204" pitchFamily="34" charset="0"/>
-              <a:cs typeface="Times New Roman" panose="02020603050405020304" pitchFamily="18" charset="0"/>
-            </a:endParaRPr>
           </a:p>
         </p:txBody>
       </p:sp>
@@ -6935,7 +7756,7 @@
     </p:spTree>
     <p:extLst>
       <p:ext uri="{BB962C8B-B14F-4D97-AF65-F5344CB8AC3E}">
-        <p14:creationId xmlns:p14="http://schemas.microsoft.com/office/powerpoint/2010/main" val="1195816902"/>
+        <p14:creationId xmlns:p14="http://schemas.microsoft.com/office/powerpoint/2010/main" val="1602302725"/>
       </p:ext>
     </p:extLst>
   </p:cSld>

</xml_diff>

<commit_message>
Update EPWS2223HausenKochZimmer Audit 3.pptx
Folie Prototyp
</commit_message>
<xml_diff>
--- a/Audits/EPWS2223HausenKochZimmer Audit 3.pptx
+++ b/Audits/EPWS2223HausenKochZimmer Audit 3.pptx
@@ -317,7 +317,7 @@
           <a:p>
             <a:fld id="{B1A8D19F-5BC0-4963-93A8-6F89220E9886}" type="slidenum">
               <a:rPr lang="de-DE" smtClean="0"/>
-              <a:t>‹Nr.›</a:t>
+              <a:t>‹#›</a:t>
             </a:fld>
             <a:endParaRPr lang="de-DE"/>
           </a:p>
@@ -575,7 +575,7 @@
           <a:p>
             <a:fld id="{28D422E8-2025-4E88-B448-A26268B25EC5}" type="slidenum">
               <a:rPr lang="de-DE" smtClean="0"/>
-              <a:t>‹Nr.›</a:t>
+              <a:t>‹#›</a:t>
             </a:fld>
             <a:endParaRPr lang="de-DE"/>
           </a:p>
@@ -1758,6 +1758,24 @@
           <a:bodyPr/>
           <a:lstStyle/>
           <a:p>
+            <a:r>
+              <a:rPr lang="de-DE" dirty="0"/>
+              <a:t>Im ersten Prototypen wurde versucht die Kernfunktionalitäten des Systems umzusetzen, der Upload von Bildern sowie damit einhergehende Pub/Sub Funktionalität. Die Grundlage für die Lösungsansätze wurden durch die PoCs, die Use Case Spezifikation sowie das Klassendiagramm gegeben. Hier ist anzumerken, dass eine detailliertere Interaktionsmodellierung die Arbeit hätte erleichtern können. Der Login erfolgt nach dem im dazugehörigen PoC getestetem Prinzip. Der damit eingeloggte User wird bis zum Logout zum currentUser. Daraufhin wird eine Liste aller Stadtobjekte geladen und anhand der Heimatstadt des Users die currentStadt gesetzt. Dem User werden daraufhin 4 Buttons angeboten (Upload, Aufruf, Sub/Unsub, Logout). Beim Upload sowie beim Aufruf eines Bildes wird aktuell noch ein hardcoded Bild verwendet. Beim Upload wird der Filepath zu diesem Bild fest verwendet und der Aufruf greift stets auf das erste Bild in der Bilderliste der Stadt zu. Dies gilt es in der weiteren Entwicklung so zu erweitern, dass ein beliebiges Bild hochgeladen und aufgerufen werden kann. Die Pub/Sub Funktionalität ist dahingegen im Grunde vollständig implementiert. Zu bedenken wäre nur ob die Verwaltung der eingegangenen Benachrichtigungen noch zu erweitern ist.</a:t>
+            </a:r>
+            <a:br>
+              <a:rPr lang="de-DE" dirty="0"/>
+            </a:br>
+            <a:br>
+              <a:rPr lang="de-DE" dirty="0"/>
+            </a:br>
+            <a:r>
+              <a:rPr lang="de-DE" dirty="0"/>
+              <a:t>Ein wichtiger Punkt bei diesem Prototypen ist, dass die Datenverwaltung auschlieslich über JSON erfolgt. So werden (1) die Bildaten zu einem String enkodiert, (2) diese in einem Bildobjekt gespeichert, (3) was Teil eines Stadtobjekts ist, (4) welches Teil einer Liste aus Stadtobjekten ist, (5) die wiederrum zum einem JSON-String enkodiert wird und (6) dieser String wird in eine entsprechende Datei geschrieben. Diese Datei, diese Liste wird zum Beginn der Activity geladen. Dies bedeutet, dass der komplette Inhalt der Datenhaltung in den Speicher geladen wird. Ab einer bestimmten Größe ist dies nicht mehr angemessen. </a:t>
+            </a:r>
+            <a:r>
+              <a:rPr lang="de-DE"/>
+              <a:t>Dieser Problematik sind wir uns bewusst aber wegen des Umfangs unseres Prototypen wird dieser Zustand in Kauf genommen.</a:t>
+            </a:r>
             <a:endParaRPr lang="de-DE" dirty="0"/>
           </a:p>
         </p:txBody>
@@ -1999,7 +2017,7 @@
           <a:p>
             <a:fld id="{4FD190AE-D9AE-4074-AAED-D637288AF7F0}" type="slidenum">
               <a:rPr lang="de-DE" smtClean="0"/>
-              <a:t>‹Nr.›</a:t>
+              <a:t>‹#›</a:t>
             </a:fld>
             <a:endParaRPr lang="de-DE"/>
           </a:p>
@@ -2197,7 +2215,7 @@
           <a:p>
             <a:fld id="{4FD190AE-D9AE-4074-AAED-D637288AF7F0}" type="slidenum">
               <a:rPr lang="de-DE" smtClean="0"/>
-              <a:t>‹Nr.›</a:t>
+              <a:t>‹#›</a:t>
             </a:fld>
             <a:endParaRPr lang="de-DE"/>
           </a:p>
@@ -2405,7 +2423,7 @@
           <a:p>
             <a:fld id="{4FD190AE-D9AE-4074-AAED-D637288AF7F0}" type="slidenum">
               <a:rPr lang="de-DE" smtClean="0"/>
-              <a:t>‹Nr.›</a:t>
+              <a:t>‹#›</a:t>
             </a:fld>
             <a:endParaRPr lang="de-DE"/>
           </a:p>
@@ -2603,7 +2621,7 @@
           <a:p>
             <a:fld id="{4FD190AE-D9AE-4074-AAED-D637288AF7F0}" type="slidenum">
               <a:rPr lang="de-DE" smtClean="0"/>
-              <a:t>‹Nr.›</a:t>
+              <a:t>‹#›</a:t>
             </a:fld>
             <a:endParaRPr lang="de-DE"/>
           </a:p>
@@ -2878,7 +2896,7 @@
           <a:p>
             <a:fld id="{4FD190AE-D9AE-4074-AAED-D637288AF7F0}" type="slidenum">
               <a:rPr lang="de-DE" smtClean="0"/>
-              <a:t>‹Nr.›</a:t>
+              <a:t>‹#›</a:t>
             </a:fld>
             <a:endParaRPr lang="de-DE"/>
           </a:p>
@@ -3143,7 +3161,7 @@
           <a:p>
             <a:fld id="{4FD190AE-D9AE-4074-AAED-D637288AF7F0}" type="slidenum">
               <a:rPr lang="de-DE" smtClean="0"/>
-              <a:t>‹Nr.›</a:t>
+              <a:t>‹#›</a:t>
             </a:fld>
             <a:endParaRPr lang="de-DE"/>
           </a:p>
@@ -3560,7 +3578,7 @@
           <a:p>
             <a:fld id="{4FD190AE-D9AE-4074-AAED-D637288AF7F0}" type="slidenum">
               <a:rPr lang="de-DE" smtClean="0"/>
-              <a:t>‹Nr.›</a:t>
+              <a:t>‹#›</a:t>
             </a:fld>
             <a:endParaRPr lang="de-DE"/>
           </a:p>
@@ -3706,7 +3724,7 @@
           <a:p>
             <a:fld id="{4FD190AE-D9AE-4074-AAED-D637288AF7F0}" type="slidenum">
               <a:rPr lang="de-DE" smtClean="0"/>
-              <a:t>‹Nr.›</a:t>
+              <a:t>‹#›</a:t>
             </a:fld>
             <a:endParaRPr lang="de-DE"/>
           </a:p>
@@ -3819,7 +3837,7 @@
           <a:p>
             <a:fld id="{4FD190AE-D9AE-4074-AAED-D637288AF7F0}" type="slidenum">
               <a:rPr lang="de-DE" smtClean="0"/>
-              <a:t>‹Nr.›</a:t>
+              <a:t>‹#›</a:t>
             </a:fld>
             <a:endParaRPr lang="de-DE"/>
           </a:p>
@@ -4130,7 +4148,7 @@
           <a:p>
             <a:fld id="{4FD190AE-D9AE-4074-AAED-D637288AF7F0}" type="slidenum">
               <a:rPr lang="de-DE" smtClean="0"/>
-              <a:t>‹Nr.›</a:t>
+              <a:t>‹#›</a:t>
             </a:fld>
             <a:endParaRPr lang="de-DE"/>
           </a:p>
@@ -4423,7 +4441,7 @@
           <a:p>
             <a:fld id="{4FD190AE-D9AE-4074-AAED-D637288AF7F0}" type="slidenum">
               <a:rPr lang="de-DE" smtClean="0"/>
-              <a:t>‹Nr.›</a:t>
+              <a:t>‹#›</a:t>
             </a:fld>
             <a:endParaRPr lang="de-DE"/>
           </a:p>
@@ -4742,7 +4760,7 @@
           <a:p>
             <a:fld id="{4FD190AE-D9AE-4074-AAED-D637288AF7F0}" type="slidenum">
               <a:rPr lang="de-DE" smtClean="0"/>
-              <a:t>‹Nr.›</a:t>
+              <a:t>‹#›</a:t>
             </a:fld>
             <a:endParaRPr lang="de-DE"/>
           </a:p>
@@ -8203,7 +8221,10 @@
           <a:bodyPr/>
           <a:lstStyle/>
           <a:p>
-            <a:endParaRPr lang="de-DE" dirty="0"/>
+            <a:r>
+              <a:rPr lang="de-DE" dirty="0"/>
+              <a:t>Erster Prototyp</a:t>
+            </a:r>
           </a:p>
         </p:txBody>
       </p:sp>
@@ -8225,10 +8246,103 @@
         </p:nvSpPr>
         <p:spPr/>
         <p:txBody>
-          <a:bodyPr/>
-          <a:lstStyle/>
-          <a:p>
-            <a:endParaRPr lang="de-DE" dirty="0"/>
+          <a:bodyPr>
+            <a:normAutofit fontScale="92500" lnSpcReduction="10000"/>
+          </a:bodyPr>
+          <a:lstStyle/>
+          <a:p>
+            <a:r>
+              <a:rPr lang="de-DE" sz="2000" dirty="0"/>
+              <a:t>Login </a:t>
+            </a:r>
+          </a:p>
+          <a:p>
+            <a:r>
+              <a:rPr lang="de-DE" sz="2000" dirty="0"/>
+              <a:t>Setze currentUser</a:t>
+            </a:r>
+          </a:p>
+          <a:p>
+            <a:r>
+              <a:rPr lang="de-DE" sz="2000" dirty="0"/>
+              <a:t>Setze currentStadt anhand Heimatstadt des Users</a:t>
+            </a:r>
+          </a:p>
+          <a:p>
+            <a:r>
+              <a:rPr lang="de-DE" sz="2000" dirty="0"/>
+              <a:t>Upload eines Bildes</a:t>
+            </a:r>
+          </a:p>
+          <a:p>
+            <a:pPr lvl="1"/>
+            <a:r>
+              <a:rPr lang="de-DE" sz="1600" dirty="0"/>
+              <a:t>Drawable File einlesen</a:t>
+            </a:r>
+          </a:p>
+          <a:p>
+            <a:pPr lvl="1"/>
+            <a:r>
+              <a:rPr lang="de-DE" sz="1600" dirty="0"/>
+              <a:t>Zu String enkodieren</a:t>
+            </a:r>
+          </a:p>
+          <a:p>
+            <a:pPr lvl="1"/>
+            <a:r>
+              <a:rPr lang="de-DE" sz="1600" dirty="0"/>
+              <a:t>Bildobjekt erzeugen und zur Stadt hinzufügen</a:t>
+            </a:r>
+          </a:p>
+          <a:p>
+            <a:pPr lvl="1"/>
+            <a:r>
+              <a:rPr lang="de-DE" sz="1600" dirty="0"/>
+              <a:t>Stadtliste enkodieren und abspeichern</a:t>
+            </a:r>
+          </a:p>
+          <a:p>
+            <a:pPr lvl="1"/>
+            <a:r>
+              <a:rPr lang="de-DE" sz="1600" dirty="0"/>
+              <a:t>Benachrichtigung an Subscriber senden</a:t>
+            </a:r>
+          </a:p>
+          <a:p>
+            <a:pPr lvl="1"/>
+            <a:r>
+              <a:rPr lang="de-DE" sz="1600" dirty="0"/>
+              <a:t>Userliste enkodieren und abspeichern</a:t>
+            </a:r>
+            <a:endParaRPr lang="de-DE" sz="1200" dirty="0"/>
+          </a:p>
+          <a:p>
+            <a:r>
+              <a:rPr lang="de-DE" sz="2000" dirty="0"/>
+              <a:t>Aufruf eines Bildes</a:t>
+            </a:r>
+          </a:p>
+          <a:p>
+            <a:r>
+              <a:rPr lang="de-DE" sz="2000" dirty="0"/>
+              <a:t>Subscribe/Unsubscribe zur Stadt</a:t>
+            </a:r>
+          </a:p>
+          <a:p>
+            <a:r>
+              <a:rPr lang="de-DE" sz="2000" dirty="0"/>
+              <a:t>Anzeige der Benachrichtigungen</a:t>
+            </a:r>
+          </a:p>
+          <a:p>
+            <a:r>
+              <a:rPr lang="de-DE" sz="2000" dirty="0"/>
+              <a:t>Logout</a:t>
+            </a:r>
+          </a:p>
+          <a:p>
+            <a:endParaRPr lang="de-DE" sz="2000" dirty="0"/>
           </a:p>
         </p:txBody>
       </p:sp>

</xml_diff>